<commit_message>
Added support and fixed buf for multiple point light spurces
</commit_message>
<xml_diff>
--- a/documentation/software/Base_render_system_documentation.pptx
+++ b/documentation/software/Base_render_system_documentation.pptx
@@ -5,10 +5,10 @@
     <p:sldMasterId id="2147483648" r:id="rId1"/>
   </p:sldMasterIdLst>
   <p:notesMasterIdLst>
-    <p:notesMasterId r:id="rId19"/>
+    <p:notesMasterId r:id="rId20"/>
   </p:notesMasterIdLst>
   <p:handoutMasterIdLst>
-    <p:handoutMasterId r:id="rId20"/>
+    <p:handoutMasterId r:id="rId21"/>
   </p:handoutMasterIdLst>
   <p:sldIdLst>
     <p:sldId id="256" r:id="rId3"/>
@@ -16,17 +16,18 @@
     <p:sldId id="258" r:id="rId5"/>
     <p:sldId id="259" r:id="rId6"/>
     <p:sldId id="260" r:id="rId7"/>
-    <p:sldId id="263" r:id="rId8"/>
-    <p:sldId id="265" r:id="rId9"/>
-    <p:sldId id="262" r:id="rId10"/>
-    <p:sldId id="261" r:id="rId11"/>
-    <p:sldId id="264" r:id="rId12"/>
-    <p:sldId id="271" r:id="rId13"/>
-    <p:sldId id="270" r:id="rId14"/>
-    <p:sldId id="266" r:id="rId15"/>
-    <p:sldId id="267" r:id="rId16"/>
-    <p:sldId id="268" r:id="rId17"/>
-    <p:sldId id="269" r:id="rId18"/>
+    <p:sldId id="265" r:id="rId8"/>
+    <p:sldId id="263" r:id="rId9"/>
+    <p:sldId id="271" r:id="rId10"/>
+    <p:sldId id="270" r:id="rId11"/>
+    <p:sldId id="276" r:id="rId12"/>
+    <p:sldId id="266" r:id="rId13"/>
+    <p:sldId id="262" r:id="rId14"/>
+    <p:sldId id="275" r:id="rId15"/>
+    <p:sldId id="277" r:id="rId16"/>
+    <p:sldId id="278" r:id="rId17"/>
+    <p:sldId id="279" r:id="rId18"/>
+    <p:sldId id="280" r:id="rId19"/>
   </p:sldIdLst>
   <p:sldSz cx="12192000" cy="6858000"/>
   <p:notesSz cx="6858000" cy="9144000"/>
@@ -126,6 +127,1038 @@
     </a:lvl9pPr>
   </p:defaultTextStyle>
 </p:presentation>
+</file>
+
+<file path=ppt/charts/chart1.xml><?xml version="1.0" encoding="utf-8"?>
+<c:chartSpace xmlns:c="http://schemas.openxmlformats.org/drawingml/2006/chart" xmlns:a="http://schemas.openxmlformats.org/drawingml/2006/main" xmlns:r="http://schemas.openxmlformats.org/officeDocument/2006/relationships">
+  <c:date1904 val="false"/>
+  <c:lang val="zh-CN"/>
+  <c:roundedCorners val="false"/>
+  <mc:AlternateContent xmlns:mc="http://schemas.openxmlformats.org/markup-compatibility/2006">
+    <mc:Choice xmlns:c14="http://schemas.microsoft.com/office/drawing/2007/8/2/chart" Requires="c14">
+      <c14:style val="102"/>
+    </mc:Choice>
+    <mc:Fallback>
+      <c:style val="2"/>
+    </mc:Fallback>
+  </mc:AlternateContent>
+  <c:chart>
+    <c:title>
+      <c:tx>
+        <c:rich>
+          <a:bodyPr rot="0" spcFirstLastPara="0" vertOverflow="ellipsis" vert="horz" wrap="square" anchor="ctr" anchorCtr="true"/>
+          <a:lstStyle/>
+          <a:p>
+            <a:pPr defTabSz="914400">
+              <a:defRPr lang="en-US" sz="1400" b="0" i="0" u="none" strike="noStrike" kern="1200" spc="0" baseline="0">
+                <a:solidFill>
+                  <a:schemeClr val="tx1">
+                    <a:lumMod val="65000"/>
+                    <a:lumOff val="35000"/>
+                  </a:schemeClr>
+                </a:solidFill>
+                <a:latin typeface="+mn-lt"/>
+                <a:ea typeface="+mn-ea"/>
+                <a:cs typeface="+mn-cs"/>
+              </a:defRPr>
+            </a:pPr>
+            <a:r>
+              <a:t>Function/ CPU Time %</a:t>
+            </a:r>
+          </a:p>
+        </c:rich>
+      </c:tx>
+      <c:layout/>
+      <c:overlay val="false"/>
+      <c:spPr>
+        <a:noFill/>
+        <a:ln>
+          <a:noFill/>
+        </a:ln>
+        <a:effectLst/>
+      </c:spPr>
+    </c:title>
+    <c:autoTitleDeleted val="false"/>
+    <c:plotArea>
+      <c:layout/>
+      <c:barChart>
+        <c:barDir val="col"/>
+        <c:grouping val="clustered"/>
+        <c:varyColors val="false"/>
+        <c:ser>
+          <c:idx val="0"/>
+          <c:order val="0"/>
+          <c:tx>
+            <c:strRef>
+              <c:f>[Performance_metrics.xlsx]Base_Gold_System_SW!$B$5</c:f>
+              <c:strCache>
+                <c:ptCount val="1"/>
+                <c:pt idx="0">
+                  <c:v>Glass Pen</c:v>
+                </c:pt>
+              </c:strCache>
+            </c:strRef>
+          </c:tx>
+          <c:spPr>
+            <a:solidFill>
+              <a:schemeClr val="accent1"/>
+            </a:solidFill>
+            <a:ln>
+              <a:noFill/>
+            </a:ln>
+            <a:effectLst/>
+          </c:spPr>
+          <c:invertIfNegative val="false"/>
+          <c:dLbls>
+            <c:delete val="true"/>
+          </c:dLbls>
+          <c:cat>
+            <c:strRef>
+              <c:f>[Performance_metrics.xlsx]Base_Gold_System_SW!$A$6:$A$11</c:f>
+              <c:strCache>
+                <c:ptCount val="6"/>
+                <c:pt idx="0">
+                  <c:v>rayTriangleIntersect</c:v>
+                </c:pt>
+                <c:pt idx="1">
+                  <c:v>crossProduct</c:v>
+                </c:pt>
+                <c:pt idx="2">
+                  <c:v>operator -</c:v>
+                </c:pt>
+                <c:pt idx="3">
+                  <c:v>operator -</c:v>
+                </c:pt>
+                <c:pt idx="4">
+                  <c:v>Intercect </c:v>
+                </c:pt>
+                <c:pt idx="5">
+                  <c:v>dotProduct</c:v>
+                </c:pt>
+              </c:strCache>
+            </c:strRef>
+          </c:cat>
+          <c:val>
+            <c:numRef>
+              <c:f>[Performance_metrics.xlsx]Base_Gold_System_SW!$B$6:$B$11</c:f>
+              <c:numCache>
+                <c:formatCode>General</c:formatCode>
+                <c:ptCount val="6"/>
+                <c:pt idx="0">
+                  <c:v>39.8557265689544</c:v>
+                </c:pt>
+                <c:pt idx="1">
+                  <c:v>14.8549615984823</c:v>
+                </c:pt>
+                <c:pt idx="2">
+                  <c:v>12.6835929133135</c:v>
+                </c:pt>
+                <c:pt idx="3">
+                  <c:v>9.74993115265751</c:v>
+                </c:pt>
+                <c:pt idx="4">
+                  <c:v>7.1448242097855</c:v>
+                </c:pt>
+                <c:pt idx="5">
+                  <c:v>5.80268351641627</c:v>
+                </c:pt>
+              </c:numCache>
+            </c:numRef>
+          </c:val>
+        </c:ser>
+        <c:ser>
+          <c:idx val="1"/>
+          <c:order val="1"/>
+          <c:tx>
+            <c:strRef>
+              <c:f>[Performance_metrics.xlsx]Base_Gold_System_SW!$D$5</c:f>
+              <c:strCache>
+                <c:ptCount val="1"/>
+                <c:pt idx="0">
+                  <c:v>Glasses Scene</c:v>
+                </c:pt>
+              </c:strCache>
+            </c:strRef>
+          </c:tx>
+          <c:spPr>
+            <a:solidFill>
+              <a:schemeClr val="accent2"/>
+            </a:solidFill>
+            <a:ln>
+              <a:noFill/>
+            </a:ln>
+            <a:effectLst/>
+          </c:spPr>
+          <c:invertIfNegative val="false"/>
+          <c:dLbls>
+            <c:delete val="true"/>
+          </c:dLbls>
+          <c:cat>
+            <c:strRef>
+              <c:f>[Performance_metrics.xlsx]Base_Gold_System_SW!$A$6:$A$11</c:f>
+              <c:strCache>
+                <c:ptCount val="6"/>
+                <c:pt idx="0">
+                  <c:v>rayTriangleIntersect</c:v>
+                </c:pt>
+                <c:pt idx="1">
+                  <c:v>crossProduct</c:v>
+                </c:pt>
+                <c:pt idx="2">
+                  <c:v>operator -</c:v>
+                </c:pt>
+                <c:pt idx="3">
+                  <c:v>operator -</c:v>
+                </c:pt>
+                <c:pt idx="4">
+                  <c:v>Intercect </c:v>
+                </c:pt>
+                <c:pt idx="5">
+                  <c:v>dotProduct</c:v>
+                </c:pt>
+              </c:strCache>
+            </c:strRef>
+          </c:cat>
+          <c:val>
+            <c:numRef>
+              <c:f>[Performance_metrics.xlsx]Base_Gold_System_SW!$D$6:$D$11</c:f>
+              <c:numCache>
+                <c:formatCode>General</c:formatCode>
+                <c:ptCount val="6"/>
+                <c:pt idx="0">
+                  <c:v>40.3896944361849</c:v>
+                </c:pt>
+                <c:pt idx="1">
+                  <c:v>14.5873051965088</c:v>
+                </c:pt>
+                <c:pt idx="2">
+                  <c:v>13.5221170832386</c:v>
+                </c:pt>
+                <c:pt idx="3">
+                  <c:v>8.99375579381876</c:v>
+                </c:pt>
+                <c:pt idx="4">
+                  <c:v>6.05705490353838</c:v>
+                </c:pt>
+                <c:pt idx="5">
+                  <c:v>5.55856785545625</c:v>
+                </c:pt>
+              </c:numCache>
+            </c:numRef>
+          </c:val>
+        </c:ser>
+        <c:ser>
+          <c:idx val="2"/>
+          <c:order val="2"/>
+          <c:tx>
+            <c:strRef>
+              <c:f>[Performance_metrics.xlsx]Base_Gold_System_SW!$F$5</c:f>
+              <c:strCache>
+                <c:ptCount val="1"/>
+                <c:pt idx="0">
+                  <c:v>Utah Teapot</c:v>
+                </c:pt>
+              </c:strCache>
+            </c:strRef>
+          </c:tx>
+          <c:spPr>
+            <a:solidFill>
+              <a:schemeClr val="accent3"/>
+            </a:solidFill>
+            <a:ln>
+              <a:noFill/>
+            </a:ln>
+            <a:effectLst/>
+          </c:spPr>
+          <c:invertIfNegative val="false"/>
+          <c:dLbls>
+            <c:delete val="true"/>
+          </c:dLbls>
+          <c:cat>
+            <c:strRef>
+              <c:f>[Performance_metrics.xlsx]Base_Gold_System_SW!$A$6:$A$11</c:f>
+              <c:strCache>
+                <c:ptCount val="6"/>
+                <c:pt idx="0">
+                  <c:v>rayTriangleIntersect</c:v>
+                </c:pt>
+                <c:pt idx="1">
+                  <c:v>crossProduct</c:v>
+                </c:pt>
+                <c:pt idx="2">
+                  <c:v>operator -</c:v>
+                </c:pt>
+                <c:pt idx="3">
+                  <c:v>operator -</c:v>
+                </c:pt>
+                <c:pt idx="4">
+                  <c:v>Intercect </c:v>
+                </c:pt>
+                <c:pt idx="5">
+                  <c:v>dotProduct</c:v>
+                </c:pt>
+              </c:strCache>
+            </c:strRef>
+          </c:cat>
+          <c:val>
+            <c:numRef>
+              <c:f>[Performance_metrics.xlsx]Base_Gold_System_SW!$F$6:$F$11</c:f>
+              <c:numCache>
+                <c:formatCode>General</c:formatCode>
+                <c:ptCount val="6"/>
+                <c:pt idx="0">
+                  <c:v>40.6282589955813</c:v>
+                </c:pt>
+                <c:pt idx="1">
+                  <c:v>14.6883119231766</c:v>
+                </c:pt>
+                <c:pt idx="2">
+                  <c:v>13.1523265837588</c:v>
+                </c:pt>
+                <c:pt idx="3">
+                  <c:v>9.36239729454388</c:v>
+                </c:pt>
+                <c:pt idx="4">
+                  <c:v>6.55205049220252</c:v>
+                </c:pt>
+                <c:pt idx="5">
+                  <c:v>5.85036802160507</c:v>
+                </c:pt>
+              </c:numCache>
+            </c:numRef>
+          </c:val>
+        </c:ser>
+        <c:dLbls>
+          <c:showLegendKey val="false"/>
+          <c:showVal val="false"/>
+          <c:showCatName val="false"/>
+          <c:showSerName val="false"/>
+          <c:showPercent val="false"/>
+          <c:showBubbleSize val="false"/>
+        </c:dLbls>
+        <c:gapWidth val="219"/>
+        <c:overlap val="-27"/>
+        <c:axId val="331039832"/>
+        <c:axId val="630440863"/>
+      </c:barChart>
+      <c:catAx>
+        <c:axId val="331039832"/>
+        <c:scaling>
+          <c:orientation val="minMax"/>
+        </c:scaling>
+        <c:delete val="false"/>
+        <c:axPos val="b"/>
+        <c:majorTickMark val="none"/>
+        <c:minorTickMark val="none"/>
+        <c:tickLblPos val="nextTo"/>
+        <c:spPr>
+          <a:noFill/>
+          <a:ln w="9525" cap="flat" cmpd="sng" algn="ctr">
+            <a:solidFill>
+              <a:schemeClr val="tx1">
+                <a:lumMod val="15000"/>
+                <a:lumOff val="85000"/>
+              </a:schemeClr>
+            </a:solidFill>
+            <a:round/>
+          </a:ln>
+          <a:effectLst/>
+        </c:spPr>
+        <c:txPr>
+          <a:bodyPr rot="-60000000" spcFirstLastPara="0" vertOverflow="ellipsis" vert="horz" wrap="square" anchor="ctr" anchorCtr="true"/>
+          <a:lstStyle/>
+          <a:p>
+            <a:pPr>
+              <a:defRPr lang="en-US" sz="900" b="0" i="0" u="none" strike="noStrike" kern="1200" baseline="0">
+                <a:solidFill>
+                  <a:schemeClr val="tx1">
+                    <a:lumMod val="65000"/>
+                    <a:lumOff val="35000"/>
+                  </a:schemeClr>
+                </a:solidFill>
+                <a:latin typeface="+mn-lt"/>
+                <a:ea typeface="+mn-ea"/>
+                <a:cs typeface="+mn-cs"/>
+              </a:defRPr>
+            </a:pPr>
+          </a:p>
+        </c:txPr>
+        <c:crossAx val="630440863"/>
+        <c:crosses val="autoZero"/>
+        <c:auto val="true"/>
+        <c:lblAlgn val="ctr"/>
+        <c:lblOffset val="100"/>
+        <c:noMultiLvlLbl val="false"/>
+      </c:catAx>
+      <c:valAx>
+        <c:axId val="630440863"/>
+        <c:scaling>
+          <c:orientation val="minMax"/>
+        </c:scaling>
+        <c:delete val="false"/>
+        <c:axPos val="l"/>
+        <c:majorGridlines>
+          <c:spPr>
+            <a:ln w="9525" cap="flat" cmpd="sng" algn="ctr">
+              <a:solidFill>
+                <a:schemeClr val="tx1">
+                  <a:lumMod val="15000"/>
+                  <a:lumOff val="85000"/>
+                </a:schemeClr>
+              </a:solidFill>
+              <a:round/>
+            </a:ln>
+            <a:effectLst/>
+          </c:spPr>
+        </c:majorGridlines>
+        <c:numFmt formatCode="General" sourceLinked="true"/>
+        <c:majorTickMark val="none"/>
+        <c:minorTickMark val="none"/>
+        <c:tickLblPos val="nextTo"/>
+        <c:spPr>
+          <a:noFill/>
+          <a:ln>
+            <a:noFill/>
+          </a:ln>
+          <a:effectLst/>
+        </c:spPr>
+        <c:txPr>
+          <a:bodyPr rot="-60000000" spcFirstLastPara="0" vertOverflow="ellipsis" vert="horz" wrap="square" anchor="ctr" anchorCtr="true"/>
+          <a:lstStyle/>
+          <a:p>
+            <a:pPr>
+              <a:defRPr lang="en-US" sz="900" b="0" i="0" u="none" strike="noStrike" kern="1200" baseline="0">
+                <a:solidFill>
+                  <a:schemeClr val="tx1">
+                    <a:lumMod val="65000"/>
+                    <a:lumOff val="35000"/>
+                  </a:schemeClr>
+                </a:solidFill>
+                <a:latin typeface="+mn-lt"/>
+                <a:ea typeface="+mn-ea"/>
+                <a:cs typeface="+mn-cs"/>
+              </a:defRPr>
+            </a:pPr>
+          </a:p>
+        </c:txPr>
+        <c:crossAx val="331039832"/>
+        <c:crosses val="autoZero"/>
+        <c:crossBetween val="between"/>
+      </c:valAx>
+      <c:spPr>
+        <a:noFill/>
+        <a:ln>
+          <a:noFill/>
+        </a:ln>
+        <a:effectLst/>
+      </c:spPr>
+    </c:plotArea>
+    <c:legend>
+      <c:legendPos val="b"/>
+      <c:layout/>
+      <c:overlay val="false"/>
+      <c:spPr>
+        <a:noFill/>
+        <a:ln>
+          <a:noFill/>
+        </a:ln>
+        <a:effectLst/>
+      </c:spPr>
+      <c:txPr>
+        <a:bodyPr rot="0" spcFirstLastPara="0" vertOverflow="ellipsis" vert="horz" wrap="square" anchor="ctr" anchorCtr="true"/>
+        <a:lstStyle/>
+        <a:p>
+          <a:pPr>
+            <a:defRPr lang="en-US" sz="900" b="0" i="0" u="none" strike="noStrike" kern="1200" baseline="0">
+              <a:solidFill>
+                <a:schemeClr val="tx1">
+                  <a:lumMod val="65000"/>
+                  <a:lumOff val="35000"/>
+                </a:schemeClr>
+              </a:solidFill>
+              <a:latin typeface="+mn-lt"/>
+              <a:ea typeface="+mn-ea"/>
+              <a:cs typeface="+mn-cs"/>
+            </a:defRPr>
+          </a:pPr>
+        </a:p>
+      </c:txPr>
+    </c:legend>
+    <c:plotVisOnly val="true"/>
+    <c:dispBlanksAs val="gap"/>
+    <c:showDLblsOverMax val="false"/>
+  </c:chart>
+  <c:spPr>
+    <a:solidFill>
+      <a:schemeClr val="bg1"/>
+    </a:solidFill>
+    <a:ln w="9525" cap="flat" cmpd="sng" algn="ctr">
+      <a:solidFill>
+        <a:schemeClr val="tx1">
+          <a:lumMod val="15000"/>
+          <a:lumOff val="85000"/>
+        </a:schemeClr>
+      </a:solidFill>
+      <a:round/>
+    </a:ln>
+    <a:effectLst/>
+  </c:spPr>
+  <c:txPr>
+    <a:bodyPr/>
+    <a:lstStyle/>
+    <a:p>
+      <a:pPr>
+        <a:defRPr lang="en-US"/>
+      </a:pPr>
+    </a:p>
+  </c:txPr>
+  <c:externalData r:id="rId1">
+    <c:autoUpdate val="false"/>
+  </c:externalData>
+</c:chartSpace>
+</file>
+
+<file path=ppt/charts/colors1.xml><?xml version="1.0" encoding="utf-8"?>
+<cs:colorStyle xmlns:cs="http://schemas.microsoft.com/office/drawing/2012/chartStyle" xmlns:a="http://schemas.openxmlformats.org/drawingml/2006/main" meth="cycle" id="10">
+  <a:schemeClr val="accent1"/>
+  <a:schemeClr val="accent2"/>
+  <a:schemeClr val="accent3"/>
+  <a:schemeClr val="accent4"/>
+  <a:schemeClr val="accent5"/>
+  <a:schemeClr val="accent6"/>
+  <cs:variation/>
+  <cs:variation>
+    <a:lumMod val="60000"/>
+  </cs:variation>
+  <cs:variation>
+    <a:lumMod val="80000"/>
+    <a:lumOff val="20000"/>
+  </cs:variation>
+  <cs:variation>
+    <a:lumMod val="80000"/>
+  </cs:variation>
+  <cs:variation>
+    <a:lumMod val="60000"/>
+    <a:lumOff val="40000"/>
+  </cs:variation>
+  <cs:variation>
+    <a:lumMod val="50000"/>
+  </cs:variation>
+  <cs:variation>
+    <a:lumMod val="70000"/>
+    <a:lumOff val="30000"/>
+  </cs:variation>
+  <cs:variation>
+    <a:lumMod val="70000"/>
+  </cs:variation>
+  <cs:variation>
+    <a:lumMod val="50000"/>
+    <a:lumOff val="50000"/>
+  </cs:variation>
+</cs:colorStyle>
+</file>
+
+<file path=ppt/charts/style1.xml><?xml version="1.0" encoding="utf-8"?>
+<cs:chartStyle xmlns:cs="http://schemas.microsoft.com/office/drawing/2012/chartStyle" xmlns:a="http://schemas.openxmlformats.org/drawingml/2006/main" id="201">
+  <cs:axisTitle>
+    <cs:lnRef idx="0"/>
+    <cs:fillRef idx="0"/>
+    <cs:effectRef idx="0"/>
+    <cs:fontRef idx="minor">
+      <a:schemeClr val="tx1">
+        <a:lumMod val="65000"/>
+        <a:lumOff val="35000"/>
+      </a:schemeClr>
+    </cs:fontRef>
+    <cs:defRPr sz="1000" kern="1200"/>
+  </cs:axisTitle>
+  <cs:categoryAxis>
+    <cs:lnRef idx="0"/>
+    <cs:fillRef idx="0"/>
+    <cs:effectRef idx="0"/>
+    <cs:fontRef idx="minor">
+      <a:schemeClr val="tx1">
+        <a:lumMod val="65000"/>
+        <a:lumOff val="35000"/>
+      </a:schemeClr>
+    </cs:fontRef>
+    <cs:spPr>
+      <a:ln w="9525" cap="flat" cmpd="sng" algn="ctr">
+        <a:solidFill>
+          <a:schemeClr val="tx1">
+            <a:lumMod val="15000"/>
+            <a:lumOff val="85000"/>
+          </a:schemeClr>
+        </a:solidFill>
+        <a:round/>
+      </a:ln>
+    </cs:spPr>
+    <cs:defRPr sz="900" kern="1200"/>
+  </cs:categoryAxis>
+  <cs:chartArea mods="allowNoFillOverride allowNoLineOverride">
+    <cs:lnRef idx="0"/>
+    <cs:fillRef idx="0"/>
+    <cs:effectRef idx="0"/>
+    <cs:fontRef idx="minor">
+      <a:schemeClr val="tx1"/>
+    </cs:fontRef>
+    <cs:spPr>
+      <a:solidFill>
+        <a:schemeClr val="bg1"/>
+      </a:solidFill>
+      <a:ln w="9525" cap="flat" cmpd="sng" algn="ctr">
+        <a:solidFill>
+          <a:schemeClr val="tx1">
+            <a:lumMod val="15000"/>
+            <a:lumOff val="85000"/>
+          </a:schemeClr>
+        </a:solidFill>
+        <a:round/>
+      </a:ln>
+    </cs:spPr>
+    <cs:defRPr sz="1000" kern="1200"/>
+  </cs:chartArea>
+  <cs:dataLabel>
+    <cs:lnRef idx="0"/>
+    <cs:fillRef idx="0"/>
+    <cs:effectRef idx="0"/>
+    <cs:fontRef idx="minor">
+      <a:schemeClr val="tx1">
+        <a:lumMod val="75000"/>
+        <a:lumOff val="25000"/>
+      </a:schemeClr>
+    </cs:fontRef>
+    <cs:defRPr sz="900" kern="1200"/>
+  </cs:dataLabel>
+  <cs:dataLabelCallout>
+    <cs:lnRef idx="0"/>
+    <cs:fillRef idx="0"/>
+    <cs:effectRef idx="0"/>
+    <cs:fontRef idx="minor">
+      <a:schemeClr val="dk1">
+        <a:lumMod val="65000"/>
+        <a:lumOff val="35000"/>
+      </a:schemeClr>
+    </cs:fontRef>
+    <cs:spPr>
+      <a:solidFill>
+        <a:schemeClr val="lt1"/>
+      </a:solidFill>
+      <a:ln>
+        <a:solidFill>
+          <a:schemeClr val="dk1">
+            <a:lumMod val="25000"/>
+            <a:lumOff val="75000"/>
+          </a:schemeClr>
+        </a:solidFill>
+      </a:ln>
+    </cs:spPr>
+    <cs:defRPr sz="900" kern="1200"/>
+    <cs:bodyPr rot="0" spcFirstLastPara="1" vertOverflow="clip" horzOverflow="clip" vert="horz" wrap="square" lIns="36576" tIns="18288" rIns="36576" bIns="18288" anchor="ctr" anchorCtr="true">
+      <a:spAutoFit/>
+    </cs:bodyPr>
+  </cs:dataLabelCallout>
+  <cs:dataPoint>
+    <cs:lnRef idx="0"/>
+    <cs:fillRef idx="1">
+      <cs:styleClr val="auto"/>
+    </cs:fillRef>
+    <cs:effectRef idx="0"/>
+    <cs:fontRef idx="minor">
+      <a:schemeClr val="tx1"/>
+    </cs:fontRef>
+  </cs:dataPoint>
+  <cs:dataPoint3D>
+    <cs:lnRef idx="0"/>
+    <cs:fillRef idx="1">
+      <cs:styleClr val="auto"/>
+    </cs:fillRef>
+    <cs:effectRef idx="0"/>
+    <cs:fontRef idx="minor">
+      <a:schemeClr val="tx1"/>
+    </cs:fontRef>
+  </cs:dataPoint3D>
+  <cs:dataPointLine>
+    <cs:lnRef idx="0">
+      <cs:styleClr val="auto"/>
+    </cs:lnRef>
+    <cs:fillRef idx="1"/>
+    <cs:effectRef idx="0"/>
+    <cs:fontRef idx="minor">
+      <a:schemeClr val="tx1"/>
+    </cs:fontRef>
+    <cs:spPr>
+      <a:ln w="28575" cap="rnd">
+        <a:solidFill>
+          <a:schemeClr val="phClr"/>
+        </a:solidFill>
+        <a:round/>
+      </a:ln>
+    </cs:spPr>
+  </cs:dataPointLine>
+  <cs:dataPointMarker>
+    <cs:lnRef idx="0">
+      <cs:styleClr val="auto"/>
+    </cs:lnRef>
+    <cs:fillRef idx="1">
+      <cs:styleClr val="auto"/>
+    </cs:fillRef>
+    <cs:effectRef idx="0"/>
+    <cs:fontRef idx="minor">
+      <a:schemeClr val="tx1"/>
+    </cs:fontRef>
+    <cs:spPr>
+      <a:ln w="9525">
+        <a:solidFill>
+          <a:schemeClr val="phClr"/>
+        </a:solidFill>
+      </a:ln>
+    </cs:spPr>
+  </cs:dataPointMarker>
+  <cs:dataPointMarkerLayout symbol="circle" size="5"/>
+  <cs:dataPointWireframe>
+    <cs:lnRef idx="0">
+      <cs:styleClr val="auto"/>
+    </cs:lnRef>
+    <cs:fillRef idx="1"/>
+    <cs:effectRef idx="0"/>
+    <cs:fontRef idx="minor">
+      <a:schemeClr val="tx1"/>
+    </cs:fontRef>
+    <cs:spPr>
+      <a:ln w="9525" cap="rnd">
+        <a:solidFill>
+          <a:schemeClr val="phClr"/>
+        </a:solidFill>
+        <a:round/>
+      </a:ln>
+    </cs:spPr>
+  </cs:dataPointWireframe>
+  <cs:dataTable>
+    <cs:lnRef idx="0"/>
+    <cs:fillRef idx="0"/>
+    <cs:effectRef idx="0"/>
+    <cs:fontRef idx="minor">
+      <a:schemeClr val="tx1">
+        <a:lumMod val="65000"/>
+        <a:lumOff val="35000"/>
+      </a:schemeClr>
+    </cs:fontRef>
+    <cs:spPr>
+      <a:noFill/>
+      <a:ln w="9525" cap="flat" cmpd="sng" algn="ctr">
+        <a:solidFill>
+          <a:schemeClr val="tx1">
+            <a:lumMod val="15000"/>
+            <a:lumOff val="85000"/>
+          </a:schemeClr>
+        </a:solidFill>
+        <a:round/>
+      </a:ln>
+    </cs:spPr>
+    <cs:defRPr sz="900" kern="1200"/>
+  </cs:dataTable>
+  <cs:downBar>
+    <cs:lnRef idx="0"/>
+    <cs:fillRef idx="0"/>
+    <cs:effectRef idx="0"/>
+    <cs:fontRef idx="minor">
+      <a:schemeClr val="dk1"/>
+    </cs:fontRef>
+    <cs:spPr>
+      <a:solidFill>
+        <a:schemeClr val="dk1">
+          <a:lumMod val="65000"/>
+          <a:lumOff val="35000"/>
+        </a:schemeClr>
+      </a:solidFill>
+      <a:ln w="9525">
+        <a:solidFill>
+          <a:schemeClr val="tx1">
+            <a:lumMod val="65000"/>
+            <a:lumOff val="35000"/>
+          </a:schemeClr>
+        </a:solidFill>
+      </a:ln>
+    </cs:spPr>
+  </cs:downBar>
+  <cs:dropLine>
+    <cs:lnRef idx="0"/>
+    <cs:fillRef idx="0"/>
+    <cs:effectRef idx="0"/>
+    <cs:fontRef idx="minor">
+      <a:schemeClr val="tx1"/>
+    </cs:fontRef>
+    <cs:spPr>
+      <a:ln w="9525" cap="flat" cmpd="sng" algn="ctr">
+        <a:solidFill>
+          <a:schemeClr val="tx1">
+            <a:lumMod val="35000"/>
+            <a:lumOff val="65000"/>
+          </a:schemeClr>
+        </a:solidFill>
+        <a:round/>
+      </a:ln>
+    </cs:spPr>
+  </cs:dropLine>
+  <cs:errorBar>
+    <cs:lnRef idx="0"/>
+    <cs:fillRef idx="0"/>
+    <cs:effectRef idx="0"/>
+    <cs:fontRef idx="minor">
+      <a:schemeClr val="tx1"/>
+    </cs:fontRef>
+    <cs:spPr>
+      <a:ln w="9525" cap="flat" cmpd="sng" algn="ctr">
+        <a:solidFill>
+          <a:schemeClr val="tx1">
+            <a:lumMod val="65000"/>
+            <a:lumOff val="35000"/>
+          </a:schemeClr>
+        </a:solidFill>
+        <a:round/>
+      </a:ln>
+    </cs:spPr>
+  </cs:errorBar>
+  <cs:floor>
+    <cs:lnRef idx="0"/>
+    <cs:fillRef idx="0"/>
+    <cs:effectRef idx="0"/>
+    <cs:fontRef idx="minor">
+      <a:schemeClr val="tx1"/>
+    </cs:fontRef>
+    <cs:spPr>
+      <a:noFill/>
+      <a:ln>
+        <a:noFill/>
+      </a:ln>
+    </cs:spPr>
+  </cs:floor>
+  <cs:gridlineMajor>
+    <cs:lnRef idx="0"/>
+    <cs:fillRef idx="0"/>
+    <cs:effectRef idx="0"/>
+    <cs:fontRef idx="minor">
+      <a:schemeClr val="tx1"/>
+    </cs:fontRef>
+    <cs:spPr>
+      <a:ln w="9525" cap="flat" cmpd="sng" algn="ctr">
+        <a:solidFill>
+          <a:schemeClr val="tx1">
+            <a:lumMod val="15000"/>
+            <a:lumOff val="85000"/>
+          </a:schemeClr>
+        </a:solidFill>
+        <a:round/>
+      </a:ln>
+    </cs:spPr>
+  </cs:gridlineMajor>
+  <cs:gridlineMinor>
+    <cs:lnRef idx="0"/>
+    <cs:fillRef idx="0"/>
+    <cs:effectRef idx="0"/>
+    <cs:fontRef idx="minor">
+      <a:schemeClr val="tx1"/>
+    </cs:fontRef>
+    <cs:spPr>
+      <a:ln w="9525" cap="flat" cmpd="sng" algn="ctr">
+        <a:solidFill>
+          <a:schemeClr val="tx1">
+            <a:lumMod val="5000"/>
+            <a:lumOff val="95000"/>
+          </a:schemeClr>
+        </a:solidFill>
+        <a:round/>
+      </a:ln>
+    </cs:spPr>
+  </cs:gridlineMinor>
+  <cs:hiLoLine>
+    <cs:lnRef idx="0"/>
+    <cs:fillRef idx="0"/>
+    <cs:effectRef idx="0"/>
+    <cs:fontRef idx="minor">
+      <a:schemeClr val="tx1"/>
+    </cs:fontRef>
+    <cs:spPr>
+      <a:ln w="9525" cap="flat" cmpd="sng" algn="ctr">
+        <a:solidFill>
+          <a:schemeClr val="tx1">
+            <a:lumMod val="75000"/>
+            <a:lumOff val="25000"/>
+          </a:schemeClr>
+        </a:solidFill>
+        <a:round/>
+      </a:ln>
+    </cs:spPr>
+  </cs:hiLoLine>
+  <cs:leaderLine>
+    <cs:lnRef idx="0"/>
+    <cs:fillRef idx="0"/>
+    <cs:effectRef idx="0"/>
+    <cs:fontRef idx="minor">
+      <a:schemeClr val="tx1"/>
+    </cs:fontRef>
+    <cs:spPr>
+      <a:ln w="9525" cap="flat" cmpd="sng" algn="ctr">
+        <a:solidFill>
+          <a:schemeClr val="tx1">
+            <a:lumMod val="35000"/>
+            <a:lumOff val="65000"/>
+          </a:schemeClr>
+        </a:solidFill>
+        <a:round/>
+      </a:ln>
+    </cs:spPr>
+  </cs:leaderLine>
+  <cs:legend>
+    <cs:lnRef idx="0"/>
+    <cs:fillRef idx="0"/>
+    <cs:effectRef idx="0"/>
+    <cs:fontRef idx="minor">
+      <a:schemeClr val="tx1">
+        <a:lumMod val="65000"/>
+        <a:lumOff val="35000"/>
+      </a:schemeClr>
+    </cs:fontRef>
+    <cs:defRPr sz="900" kern="1200"/>
+  </cs:legend>
+  <cs:plotArea mods="allowNoFillOverride allowNoLineOverride">
+    <cs:lnRef idx="0"/>
+    <cs:fillRef idx="0"/>
+    <cs:effectRef idx="0"/>
+    <cs:fontRef idx="minor">
+      <a:schemeClr val="tx1"/>
+    </cs:fontRef>
+  </cs:plotArea>
+  <cs:plotArea3D mods="allowNoFillOverride allowNoLineOverride">
+    <cs:lnRef idx="0"/>
+    <cs:fillRef idx="0"/>
+    <cs:effectRef idx="0"/>
+    <cs:fontRef idx="minor">
+      <a:schemeClr val="tx1"/>
+    </cs:fontRef>
+  </cs:plotArea3D>
+  <cs:seriesAxis>
+    <cs:lnRef idx="0"/>
+    <cs:fillRef idx="0"/>
+    <cs:effectRef idx="0"/>
+    <cs:fontRef idx="minor">
+      <a:schemeClr val="tx1">
+        <a:lumMod val="65000"/>
+        <a:lumOff val="35000"/>
+      </a:schemeClr>
+    </cs:fontRef>
+    <cs:defRPr sz="900" kern="1200"/>
+  </cs:seriesAxis>
+  <cs:seriesLine>
+    <cs:lnRef idx="0"/>
+    <cs:fillRef idx="0"/>
+    <cs:effectRef idx="0"/>
+    <cs:fontRef idx="minor">
+      <a:schemeClr val="tx1"/>
+    </cs:fontRef>
+    <cs:spPr>
+      <a:ln w="9525" cap="flat" cmpd="sng" algn="ctr">
+        <a:solidFill>
+          <a:schemeClr val="tx1">
+            <a:lumMod val="35000"/>
+            <a:lumOff val="65000"/>
+          </a:schemeClr>
+        </a:solidFill>
+        <a:round/>
+      </a:ln>
+    </cs:spPr>
+  </cs:seriesLine>
+  <cs:title>
+    <cs:lnRef idx="0"/>
+    <cs:fillRef idx="0"/>
+    <cs:effectRef idx="0"/>
+    <cs:fontRef idx="minor">
+      <a:schemeClr val="tx1">
+        <a:lumMod val="65000"/>
+        <a:lumOff val="35000"/>
+      </a:schemeClr>
+    </cs:fontRef>
+    <cs:defRPr sz="1400" b="0" kern="1200" spc="0" baseline="0"/>
+  </cs:title>
+  <cs:trendline>
+    <cs:lnRef idx="0">
+      <cs:styleClr val="auto"/>
+    </cs:lnRef>
+    <cs:fillRef idx="0"/>
+    <cs:effectRef idx="0"/>
+    <cs:fontRef idx="minor">
+      <a:schemeClr val="tx1"/>
+    </cs:fontRef>
+    <cs:spPr>
+      <a:ln w="19050" cap="rnd">
+        <a:solidFill>
+          <a:schemeClr val="phClr"/>
+        </a:solidFill>
+        <a:prstDash val="sysDot"/>
+      </a:ln>
+    </cs:spPr>
+  </cs:trendline>
+  <cs:trendlineLabel>
+    <cs:lnRef idx="0"/>
+    <cs:fillRef idx="0"/>
+    <cs:effectRef idx="0"/>
+    <cs:fontRef idx="minor">
+      <a:schemeClr val="tx1">
+        <a:lumMod val="65000"/>
+        <a:lumOff val="35000"/>
+      </a:schemeClr>
+    </cs:fontRef>
+    <cs:defRPr sz="900" kern="1200"/>
+  </cs:trendlineLabel>
+  <cs:upBar>
+    <cs:lnRef idx="0"/>
+    <cs:fillRef idx="0"/>
+    <cs:effectRef idx="0"/>
+    <cs:fontRef idx="minor">
+      <a:schemeClr val="dk1"/>
+    </cs:fontRef>
+    <cs:spPr>
+      <a:solidFill>
+        <a:schemeClr val="lt1"/>
+      </a:solidFill>
+      <a:ln w="9525">
+        <a:solidFill>
+          <a:schemeClr val="tx1">
+            <a:lumMod val="15000"/>
+            <a:lumOff val="85000"/>
+          </a:schemeClr>
+        </a:solidFill>
+      </a:ln>
+    </cs:spPr>
+  </cs:upBar>
+  <cs:valueAxis>
+    <cs:lnRef idx="0"/>
+    <cs:fillRef idx="0"/>
+    <cs:effectRef idx="0"/>
+    <cs:fontRef idx="minor">
+      <a:schemeClr val="tx1">
+        <a:lumMod val="65000"/>
+        <a:lumOff val="35000"/>
+      </a:schemeClr>
+    </cs:fontRef>
+    <cs:defRPr sz="900" kern="1200"/>
+  </cs:valueAxis>
+  <cs:wall>
+    <cs:lnRef idx="0"/>
+    <cs:fillRef idx="0"/>
+    <cs:effectRef idx="0"/>
+    <cs:fontRef idx="minor">
+      <a:schemeClr val="tx1"/>
+    </cs:fontRef>
+    <cs:spPr>
+      <a:noFill/>
+      <a:ln>
+        <a:noFill/>
+      </a:ln>
+    </cs:spPr>
+  </cs:wall>
+</cs:chartStyle>
 </file>
 
 <file path=ppt/handoutMasters/handoutMaster1.xml><?xml version="1.0" encoding="utf-8"?>
@@ -12911,10 +13944,10 @@
           <a:lstStyle/>
           <a:p>
             <a:r>
-              <a:rPr lang="" altLang="en-GB"/>
+              <a:rPr lang="en-US" altLang="en-GB"/>
               <a:t>Base render system Documentation</a:t>
             </a:r>
-            <a:endParaRPr lang="" altLang="en-GB"/>
+            <a:endParaRPr lang="en-US" altLang="en-GB"/>
           </a:p>
         </p:txBody>
       </p:sp>
@@ -12970,10 +14003,10 @@
           <a:bodyPr/>
           <a:p>
             <a:r>
-              <a:rPr lang="" altLang="en-US"/>
-              <a:t>Lighting </a:t>
-            </a:r>
-            <a:endParaRPr lang="" altLang="en-US"/>
+              <a:rPr lang="en-US" altLang="en-US"/>
+              <a:t>Cast the ray</a:t>
+            </a:r>
+            <a:endParaRPr lang="en-US" altLang="en-US"/>
           </a:p>
         </p:txBody>
       </p:sp>
@@ -12987,14 +14020,53 @@
             <p:ph idx="1"/>
           </p:nvPr>
         </p:nvSpPr>
-        <p:spPr/>
+        <p:spPr>
+          <a:xfrm>
+            <a:off x="472440" y="2273935"/>
+            <a:ext cx="5020310" cy="4198620"/>
+          </a:xfrm>
+        </p:spPr>
         <p:txBody>
           <a:bodyPr/>
           <a:p>
-            <a:endParaRPr lang="en-US"/>
+            <a:r>
+              <a:rPr lang="en-US" altLang="en-US"/>
+              <a:t>Experiments were run with multiple scenes show that although the scenes utilize different effects the majority of execution time was spend on the Ray Triangle intersection ( Pending more investigation</a:t>
+            </a:r>
+            <a:endParaRPr lang="en-US" altLang="en-US"/>
+          </a:p>
+          <a:p>
+            <a:r>
+              <a:rPr lang="" altLang="en-US"/>
+              <a:t>Exept for the intersect function all other opprations belong in the rayTriangleIntersect function</a:t>
+            </a:r>
+            <a:endParaRPr lang="en-US" altLang="en-US"/>
+          </a:p>
+          <a:p>
+            <a:endParaRPr lang="en-US" altLang="en-US"/>
+          </a:p>
+          <a:p>
+            <a:pPr lvl="0"/>
+            <a:endParaRPr lang="en-US" altLang="en-US"/>
           </a:p>
         </p:txBody>
       </p:sp>
+      <p:graphicFrame>
+        <p:nvGraphicFramePr>
+          <p:cNvPr id="4" name="Chart 3"/>
+          <p:cNvGraphicFramePr/>
+          <p:nvPr/>
+        </p:nvGraphicFramePr>
+        <p:xfrm>
+          <a:off x="5493385" y="2273618"/>
+          <a:ext cx="6159500" cy="4346575"/>
+        </p:xfrm>
+        <a:graphic>
+          <a:graphicData uri="http://schemas.openxmlformats.org/drawingml/2006/chart">
+            <c:chart xmlns:c="http://schemas.openxmlformats.org/drawingml/2006/chart" xmlns:r="http://schemas.openxmlformats.org/officeDocument/2006/relationships" r:id="rId1"/>
+          </a:graphicData>
+        </a:graphic>
+      </p:graphicFrame>
     </p:spTree>
   </p:cSld>
   <p:clrMapOvr>
@@ -13028,10 +14100,10 @@
           <a:bodyPr/>
           <a:p>
             <a:r>
-              <a:rPr lang="" altLang="en-US"/>
-              <a:t>Render</a:t>
-            </a:r>
-            <a:endParaRPr lang="" altLang="en-US"/>
+              <a:rPr lang="en-US" altLang="en-US"/>
+              <a:t>Trace the ray</a:t>
+            </a:r>
+            <a:endParaRPr lang="en-US" altLang="en-US"/>
           </a:p>
         </p:txBody>
       </p:sp>
@@ -13045,11 +14117,49 @@
             <p:ph idx="1"/>
           </p:nvPr>
         </p:nvSpPr>
-        <p:spPr/>
+        <p:spPr>
+          <a:xfrm>
+            <a:off x="441325" y="2282190"/>
+            <a:ext cx="11304270" cy="4478020"/>
+          </a:xfrm>
+        </p:spPr>
         <p:txBody>
           <a:bodyPr/>
           <a:p>
-            <a:endParaRPr lang="en-US"/>
+            <a:r>
+              <a:rPr lang="en-US" altLang="en-US"/>
+              <a:t>For each object in the scene we check whenever they intersect with a Ray </a:t>
+            </a:r>
+            <a:endParaRPr lang="en-US" altLang="en-US"/>
+          </a:p>
+          <a:p>
+            <a:pPr lvl="1"/>
+            <a:r>
+              <a:rPr lang="en-US" altLang="en-US"/>
+              <a:t>That means for each object we check all the triangles in its mesh and we keep track of the nearest triangle that was intersected </a:t>
+            </a:r>
+            <a:endParaRPr lang="en-US" altLang="en-US"/>
+          </a:p>
+          <a:p>
+            <a:r>
+              <a:rPr lang="en-US" altLang="en-US"/>
+              <a:t>Then by checking the distance to that intersection point we can select or discard it </a:t>
+            </a:r>
+            <a:endParaRPr lang="en-US" altLang="en-US"/>
+          </a:p>
+          <a:p>
+            <a:r>
+              <a:rPr lang="en-US" altLang="en-US"/>
+              <a:t>If the ray type is shadow or the object is reflective and refractive we skip</a:t>
+            </a:r>
+            <a:endParaRPr lang="en-US" altLang="en-US"/>
+          </a:p>
+          <a:p>
+            <a:r>
+              <a:rPr lang="en-US" altLang="en-US"/>
+              <a:t>This can be further optimized by introdusing BVH data structures to hold the objejcts </a:t>
+            </a:r>
+            <a:endParaRPr lang="en-US" altLang="en-US"/>
           </a:p>
         </p:txBody>
       </p:sp>
@@ -13086,10 +14196,10 @@
           <a:bodyPr/>
           <a:p>
             <a:r>
-              <a:rPr lang="" altLang="en-US"/>
-              <a:t>Cast the ray</a:t>
-            </a:r>
-            <a:endParaRPr lang="" altLang="en-US"/>
+              <a:rPr lang="en-US" altLang="en-US"/>
+              <a:t>Ray triangle intersection</a:t>
+            </a:r>
+            <a:endParaRPr lang="en-US" altLang="en-US"/>
           </a:p>
         </p:txBody>
       </p:sp>
@@ -13103,11 +14213,75 @@
             <p:ph idx="1"/>
           </p:nvPr>
         </p:nvSpPr>
-        <p:spPr/>
+        <p:spPr>
+          <a:xfrm>
+            <a:off x="445135" y="2275205"/>
+            <a:ext cx="11225530" cy="4327525"/>
+          </a:xfrm>
+        </p:spPr>
         <p:txBody>
           <a:bodyPr/>
           <a:p>
-            <a:endParaRPr lang="en-US"/>
+            <a:r>
+              <a:rPr lang="en-US" altLang="en-US"/>
+              <a:t>Ray triangle intersection is found using the Möller-Trumbore algorithm </a:t>
+            </a:r>
+            <a:endParaRPr lang="en-US" altLang="en-US"/>
+          </a:p>
+          <a:p>
+            <a:r>
+              <a:rPr lang="en-US" altLang="en-US"/>
+              <a:t>It utilized dot and cross products to evaluate the determinand of a system containg the </a:t>
+            </a:r>
+            <a:endParaRPr lang="en-US" altLang="en-US"/>
+          </a:p>
+          <a:p>
+            <a:pPr lvl="1"/>
+            <a:r>
+              <a:rPr lang="en-US" altLang="en-US" sz="1600"/>
+              <a:t>Ray origin </a:t>
+            </a:r>
+            <a:endParaRPr lang="en-US" altLang="en-US" sz="1600"/>
+          </a:p>
+          <a:p>
+            <a:pPr lvl="1"/>
+            <a:r>
+              <a:rPr lang="en-US" altLang="en-US"/>
+              <a:t>Ray direction</a:t>
+            </a:r>
+            <a:endParaRPr lang="en-US" altLang="en-US"/>
+          </a:p>
+          <a:p>
+            <a:pPr lvl="1"/>
+            <a:r>
+              <a:rPr lang="en-US" altLang="en-US"/>
+              <a:t>The triangle vertecies</a:t>
+            </a:r>
+            <a:endParaRPr lang="en-US" altLang="en-US"/>
+          </a:p>
+          <a:p>
+            <a:pPr lvl="0"/>
+            <a:r>
+              <a:rPr lang="en-US" altLang="en-US"/>
+              <a:t>and solves for </a:t>
+            </a:r>
+            <a:endParaRPr lang="en-US" altLang="en-US"/>
+          </a:p>
+          <a:p>
+            <a:pPr lvl="1"/>
+            <a:r>
+              <a:rPr lang="en-US" altLang="en-US"/>
+              <a:t>The distance from the Ray origin</a:t>
+            </a:r>
+            <a:endParaRPr lang="en-US" altLang="en-US"/>
+          </a:p>
+          <a:p>
+            <a:pPr lvl="1"/>
+            <a:r>
+              <a:rPr lang="en-US" altLang="en-US"/>
+              <a:t>And the u,v coordinates of the intersection point</a:t>
+            </a:r>
+            <a:endParaRPr lang="en-US" altLang="en-US"/>
           </a:p>
         </p:txBody>
       </p:sp>
@@ -13145,7 +14319,7 @@
           <a:p>
             <a:r>
               <a:rPr lang="" altLang="en-US"/>
-              <a:t>Trace the ray</a:t>
+              <a:t>Shading - Diffuse</a:t>
             </a:r>
             <a:endParaRPr lang="" altLang="en-US"/>
           </a:p>
@@ -13161,11 +14335,91 @@
             <p:ph idx="1"/>
           </p:nvPr>
         </p:nvSpPr>
-        <p:spPr/>
+        <p:spPr>
+          <a:xfrm>
+            <a:off x="457200" y="2259330"/>
+            <a:ext cx="11119485" cy="4427855"/>
+          </a:xfrm>
+        </p:spPr>
         <p:txBody>
           <a:bodyPr/>
           <a:p>
-            <a:endParaRPr lang="en-US"/>
+            <a:r>
+              <a:rPr lang="" altLang="en-US"/>
+              <a:t>For each light source we illuminate the object using the illuminate funcrion from the light class. </a:t>
+            </a:r>
+            <a:endParaRPr lang="" altLang="en-US"/>
+          </a:p>
+          <a:p>
+            <a:r>
+              <a:rPr lang="" altLang="en-US"/>
+              <a:t>We recursivly call the trace function in order to determine shadows.</a:t>
+            </a:r>
+            <a:endParaRPr lang="" altLang="en-US"/>
+          </a:p>
+          <a:p>
+            <a:pPr lvl="1"/>
+            <a:r>
+              <a:rPr lang="" altLang="en-US"/>
+              <a:t>If the trace function returns true the intersection point is in shadow</a:t>
+            </a:r>
+            <a:endParaRPr lang="" altLang="en-US"/>
+          </a:p>
+          <a:p>
+            <a:pPr lvl="0"/>
+            <a:r>
+              <a:rPr lang="" altLang="en-US"/>
+              <a:t>Then we compute a simple pattern</a:t>
+            </a:r>
+            <a:endParaRPr lang="" altLang="en-US"/>
+          </a:p>
+          <a:p>
+            <a:pPr lvl="0"/>
+            <a:r>
+              <a:rPr lang="" altLang="en-US"/>
+              <a:t>At the end we compute the overal controbiutions of </a:t>
+            </a:r>
+            <a:endParaRPr lang="" altLang="en-US"/>
+          </a:p>
+          <a:p>
+            <a:pPr lvl="1"/>
+            <a:r>
+              <a:rPr lang="" altLang="en-US"/>
+              <a:t>potential shadow</a:t>
+            </a:r>
+            <a:endParaRPr lang="" altLang="en-US"/>
+          </a:p>
+          <a:p>
+            <a:pPr lvl="1"/>
+            <a:r>
+              <a:rPr lang="" altLang="en-US"/>
+              <a:t>pattern</a:t>
+            </a:r>
+            <a:endParaRPr lang="" altLang="en-US"/>
+          </a:p>
+          <a:p>
+            <a:pPr lvl="1"/>
+            <a:r>
+              <a:rPr lang="" altLang="en-US"/>
+              <a:t>light intensity </a:t>
+            </a:r>
+            <a:endParaRPr lang="" altLang="en-US"/>
+          </a:p>
+          <a:p>
+            <a:pPr lvl="1"/>
+            <a:r>
+              <a:rPr lang="" altLang="en-US"/>
+              <a:t>the objects normal</a:t>
+            </a:r>
+            <a:endParaRPr lang="" altLang="en-US"/>
+          </a:p>
+          <a:p>
+            <a:pPr lvl="2"/>
+            <a:r>
+              <a:rPr lang="" altLang="en-US"/>
+              <a:t>If we enabled shooth shading or not ( the default is on )</a:t>
+            </a:r>
+            <a:endParaRPr lang="" altLang="en-US"/>
           </a:p>
         </p:txBody>
       </p:sp>
@@ -13203,7 +14457,7 @@
           <a:p>
             <a:r>
               <a:rPr lang="" altLang="en-US"/>
-              <a:t>Reflect</a:t>
+              <a:t>Illuminate</a:t>
             </a:r>
             <a:endParaRPr lang="" altLang="en-US"/>
           </a:p>
@@ -13219,11 +14473,106 @@
             <p:ph idx="1"/>
           </p:nvPr>
         </p:nvSpPr>
-        <p:spPr/>
+        <p:spPr>
+          <a:xfrm>
+            <a:off x="474345" y="2312035"/>
+            <a:ext cx="11143615" cy="4208780"/>
+          </a:xfrm>
+        </p:spPr>
         <p:txBody>
-          <a:bodyPr/>
-          <a:p>
-            <a:endParaRPr lang="en-US"/>
+          <a:bodyPr>
+            <a:normAutofit lnSpcReduction="20000"/>
+          </a:bodyPr>
+          <a:p>
+            <a:r>
+              <a:rPr lang="" altLang="en-US"/>
+              <a:t>Depending on the type of light in the scene and its given </a:t>
+            </a:r>
+            <a:endParaRPr lang="" altLang="en-US"/>
+          </a:p>
+          <a:p>
+            <a:pPr lvl="1"/>
+            <a:r>
+              <a:rPr lang="" altLang="en-US"/>
+              <a:t>light to world matrix</a:t>
+            </a:r>
+            <a:endParaRPr lang="" altLang="en-US"/>
+          </a:p>
+          <a:p>
+            <a:pPr lvl="1"/>
+            <a:r>
+              <a:rPr lang="" altLang="en-US"/>
+              <a:t>colour </a:t>
+            </a:r>
+            <a:endParaRPr lang="" altLang="en-US"/>
+          </a:p>
+          <a:p>
+            <a:pPr lvl="1"/>
+            <a:r>
+              <a:rPr lang="" altLang="en-US"/>
+              <a:t>intensity</a:t>
+            </a:r>
+            <a:endParaRPr lang="" altLang="en-US"/>
+          </a:p>
+          <a:p>
+            <a:pPr lvl="0"/>
+            <a:r>
+              <a:rPr lang="" altLang="en-US" sz="1800"/>
+              <a:t>We culculate its contribuituion and produse the hit point position, light direction, light intencity and distance to the intersected triangle </a:t>
+            </a:r>
+            <a:endParaRPr lang="" altLang="en-US"/>
+          </a:p>
+          <a:p>
+            <a:pPr lvl="0"/>
+            <a:r>
+              <a:rPr lang="" altLang="en-US" sz="1800"/>
+              <a:t>If the light is a point light </a:t>
+            </a:r>
+            <a:endParaRPr lang="" altLang="en-US" sz="1800"/>
+          </a:p>
+          <a:p>
+            <a:pPr lvl="1"/>
+            <a:r>
+              <a:rPr lang="" altLang="en-US" sz="1600"/>
+              <a:t>We use the inverse square law to attenuate the light intensity ( by using the square of this vector length )</a:t>
+            </a:r>
+            <a:endParaRPr lang="" altLang="en-US" sz="1420"/>
+          </a:p>
+          <a:p>
+            <a:pPr lvl="0"/>
+            <a:r>
+              <a:rPr lang="" altLang="en-US" sz="1800"/>
+              <a:t>If the light is a distand light </a:t>
+            </a:r>
+            <a:r>
+              <a:rPr lang="" altLang="en-US"/>
+              <a:t> </a:t>
+            </a:r>
+            <a:endParaRPr lang="" altLang="en-US"/>
+          </a:p>
+          <a:p>
+            <a:pPr lvl="1"/>
+            <a:r>
+              <a:rPr lang="" altLang="en-US"/>
+              <a:t>We acount for the colour and the inensity</a:t>
+            </a:r>
+            <a:endParaRPr lang="" altLang="en-US"/>
+          </a:p>
+          <a:p>
+            <a:pPr lvl="1"/>
+            <a:r>
+              <a:rPr lang="" altLang="en-US"/>
+              <a:t>The direction remains the default </a:t>
+            </a:r>
+            <a:endParaRPr lang="" altLang="en-US"/>
+          </a:p>
+          <a:p>
+            <a:pPr lvl="1"/>
+            <a:r>
+              <a:rPr lang="" altLang="en-US"/>
+              <a:t>The distance is set as the max distance</a:t>
+            </a:r>
+            <a:endParaRPr lang="" altLang="en-US"/>
           </a:p>
         </p:txBody>
       </p:sp>
@@ -13261,7 +14610,7 @@
           <a:p>
             <a:r>
               <a:rPr lang="" altLang="en-US"/>
-              <a:t>Refract</a:t>
+              <a:t>Shading - Reflect</a:t>
             </a:r>
             <a:endParaRPr lang="" altLang="en-US"/>
           </a:p>
@@ -13277,10 +14626,38 @@
             <p:ph idx="1"/>
           </p:nvPr>
         </p:nvSpPr>
-        <p:spPr/>
+        <p:spPr>
+          <a:xfrm>
+            <a:off x="384175" y="2275205"/>
+            <a:ext cx="11264265" cy="4364990"/>
+          </a:xfrm>
+        </p:spPr>
         <p:txBody>
           <a:bodyPr/>
           <a:p>
+            <a:r>
+              <a:rPr lang="" altLang="en-US"/>
+              <a:t>If the object is a mirror like surface we </a:t>
+            </a:r>
+            <a:r>
+              <a:rPr lang="en-US"/>
+              <a:t>compute the reflection direction using the incident view direction (the primary ray direction) and the normal of the surface at the intersection point.</a:t>
+            </a:r>
+            <a:r>
+              <a:rPr lang="" altLang="en-US"/>
+              <a:t> </a:t>
+            </a:r>
+            <a:r>
+              <a:rPr lang="en-US"/>
+              <a:t>R = I−2(N⋅I)N</a:t>
+            </a:r>
+            <a:endParaRPr lang="en-US"/>
+          </a:p>
+          <a:p>
+            <a:r>
+              <a:rPr lang="en-US"/>
+              <a:t>Use the ray direction to find the hit normal</a:t>
+            </a:r>
             <a:endParaRPr lang="en-US"/>
           </a:p>
         </p:txBody>
@@ -13318,8 +14695,12 @@
           <a:bodyPr/>
           <a:p>
             <a:r>
+              <a:rPr lang="en-US" altLang="en-US"/>
+              <a:t>Shading - Reflect</a:t>
+            </a:r>
+            <a:r>
               <a:rPr lang="" altLang="en-US"/>
-              <a:t>Fresnel</a:t>
+              <a:t> and Refract</a:t>
             </a:r>
             <a:endParaRPr lang="" altLang="en-US"/>
           </a:p>
@@ -13335,11 +14716,185 @@
             <p:ph idx="1"/>
           </p:nvPr>
         </p:nvSpPr>
+        <p:spPr>
+          <a:xfrm>
+            <a:off x="384175" y="2275205"/>
+            <a:ext cx="11264265" cy="4364990"/>
+          </a:xfrm>
+        </p:spPr>
+        <p:txBody>
+          <a:bodyPr/>
+          <a:p>
+            <a:r>
+              <a:rPr lang="" altLang="en-US"/>
+              <a:t>What we need to find is the refraction and reflection colour and mix them with a weight</a:t>
+            </a:r>
+            <a:endParaRPr lang="" altLang="en-US"/>
+          </a:p>
+          <a:p>
+            <a:r>
+              <a:rPr lang="" altLang="en-US"/>
+              <a:t>At first we compute fresnel equation (relation of reflected light for a given incident direction and surface normal) based on Ray direction, hit normal, index of refraction and that gives us the kr factor.</a:t>
+            </a:r>
+            <a:endParaRPr lang="" altLang="en-US"/>
+          </a:p>
+          <a:p>
+            <a:r>
+              <a:rPr lang="" altLang="en-US"/>
+              <a:t>This factor then is used to determine if this is not a case of total internal reflextion to compute the refraction</a:t>
+            </a:r>
+            <a:endParaRPr lang="" altLang="en-US"/>
+          </a:p>
+          <a:p>
+            <a:r>
+              <a:rPr lang="" altLang="en-US"/>
+              <a:t>After that the castRay function is recursivly called to culculate the next ray from that point with a plus 1 to the depth in order to stop at the selected </a:t>
+            </a:r>
+            <a:endParaRPr lang="" altLang="en-US"/>
+          </a:p>
+          <a:p>
+            <a:endParaRPr lang="" altLang="en-US"/>
+          </a:p>
+          <a:p>
+            <a:endParaRPr lang="" altLang="en-US"/>
+          </a:p>
+        </p:txBody>
+      </p:sp>
+    </p:spTree>
+  </p:cSld>
+  <p:clrMapOvr>
+    <a:masterClrMapping/>
+  </p:clrMapOvr>
+</p:sld>
+</file>
+
+<file path=ppt/slides/slide17.xml><?xml version="1.0" encoding="utf-8"?>
+<p:sld xmlns:a="http://schemas.openxmlformats.org/drawingml/2006/main" xmlns:r="http://schemas.openxmlformats.org/officeDocument/2006/relationships" xmlns:p="http://schemas.openxmlformats.org/presentationml/2006/main">
+  <p:cSld>
+    <p:spTree>
+      <p:nvGrpSpPr>
+        <p:cNvPr id="1" name=""/>
+        <p:cNvGrpSpPr/>
+        <p:nvPr/>
+      </p:nvGrpSpPr>
+      <p:grpSpPr/>
+      <p:sp>
+        <p:nvSpPr>
+          <p:cNvPr id="2" name="Title 1"/>
+          <p:cNvSpPr>
+            <a:spLocks noGrp="true"/>
+          </p:cNvSpPr>
+          <p:nvPr>
+            <p:ph type="title"/>
+          </p:nvPr>
+        </p:nvSpPr>
         <p:spPr/>
         <p:txBody>
           <a:bodyPr/>
           <a:p>
-            <a:endParaRPr lang="en-US"/>
+            <a:r>
+              <a:rPr lang="en-US" altLang="en-US"/>
+              <a:t>Shading - </a:t>
+            </a:r>
+            <a:r>
+              <a:rPr lang="" altLang="en-US"/>
+              <a:t>Phong</a:t>
+            </a:r>
+            <a:endParaRPr lang="" altLang="en-US"/>
+          </a:p>
+        </p:txBody>
+      </p:sp>
+      <p:sp>
+        <p:nvSpPr>
+          <p:cNvPr id="3" name="Content Placeholder 2"/>
+          <p:cNvSpPr>
+            <a:spLocks noGrp="true"/>
+          </p:cNvSpPr>
+          <p:nvPr>
+            <p:ph idx="1"/>
+          </p:nvPr>
+        </p:nvSpPr>
+        <p:spPr>
+          <a:xfrm>
+            <a:off x="384175" y="2275205"/>
+            <a:ext cx="11264265" cy="4364990"/>
+          </a:xfrm>
+        </p:spPr>
+        <p:txBody>
+          <a:bodyPr/>
+          <a:p>
+            <a:r>
+              <a:rPr lang="" altLang="en-US"/>
+              <a:t>Like the diffuse material type Phong is a kinda more advanst diffuse effect incorporating specular light reflection.</a:t>
+            </a:r>
+            <a:endParaRPr lang="" altLang="en-US"/>
+          </a:p>
+          <a:p>
+            <a:r>
+              <a:rPr lang="en-US" altLang="en-US">
+                <a:sym typeface="+mn-ea"/>
+              </a:rPr>
+              <a:t>For each light source we illuminate the object using the illuminate funcrion from the light class. </a:t>
+            </a:r>
+            <a:endParaRPr lang="en-US" altLang="en-US">
+              <a:sym typeface="+mn-ea"/>
+            </a:endParaRPr>
+          </a:p>
+          <a:p>
+            <a:r>
+              <a:rPr lang="en-US" altLang="en-US" sz="1800">
+                <a:sym typeface="+mn-ea"/>
+              </a:rPr>
+              <a:t>We recursivly call the trace function in order to determine shadows.</a:t>
+            </a:r>
+            <a:endParaRPr lang="en-US" altLang="en-US" sz="1800"/>
+          </a:p>
+          <a:p>
+            <a:pPr lvl="1"/>
+            <a:r>
+              <a:rPr lang="en-US" altLang="en-US" sz="1800">
+                <a:sym typeface="+mn-ea"/>
+              </a:rPr>
+              <a:t>If the trace function returns true the intersection point is in shadow</a:t>
+            </a:r>
+            <a:endParaRPr lang="en-US" altLang="en-US" sz="1800">
+              <a:sym typeface="+mn-ea"/>
+            </a:endParaRPr>
+          </a:p>
+          <a:p>
+            <a:pPr lvl="0"/>
+            <a:r>
+              <a:rPr lang="" altLang="en-US" sz="2025"/>
+              <a:t>And now the differences starts we compute </a:t>
+            </a:r>
+            <a:endParaRPr lang="" altLang="en-US" sz="2025"/>
+          </a:p>
+          <a:p>
+            <a:pPr lvl="1"/>
+            <a:r>
+              <a:rPr lang="" altLang="en-US" sz="1800"/>
+              <a:t>the diffuse component based on the albedo if the object settings (ratio of reflected light over the amount of incident light) value that reflects a bit of he light falling on an object </a:t>
+            </a:r>
+            <a:endParaRPr lang="" altLang="en-US" sz="1800"/>
+          </a:p>
+          <a:p>
+            <a:pPr lvl="1"/>
+            <a:r>
+              <a:rPr lang="" altLang="en-US" sz="1800"/>
+              <a:t>the specular component is based on the n factor of the objects settings</a:t>
+            </a:r>
+            <a:endParaRPr lang="" altLang="en-US" sz="1800"/>
+          </a:p>
+          <a:p>
+            <a:pPr lvl="0"/>
+            <a:r>
+              <a:rPr lang="" altLang="en-US" sz="2025"/>
+              <a:t>At the end the two are mixed  </a:t>
+            </a:r>
+            <a:endParaRPr lang="en-US" altLang="en-US" sz="1800"/>
+          </a:p>
+          <a:p>
+            <a:endParaRPr lang="" altLang="en-US"/>
           </a:p>
         </p:txBody>
       </p:sp>
@@ -13384,10 +14939,10 @@
           <a:lstStyle/>
           <a:p>
             <a:r>
-              <a:rPr lang="" altLang="en-GB"/>
+              <a:rPr lang="en-US" altLang="en-GB"/>
               <a:t>Specifications</a:t>
             </a:r>
-            <a:endParaRPr lang="" altLang="en-GB"/>
+            <a:endParaRPr lang="en-US" altLang="en-GB"/>
           </a:p>
         </p:txBody>
       </p:sp>
@@ -13412,82 +14967,82 @@
           <a:lstStyle/>
           <a:p>
             <a:r>
-              <a:rPr lang="" altLang="en-GB"/>
+              <a:rPr lang="en-US" altLang="en-GB"/>
               <a:t>The base system can support direct illumination for surfaces</a:t>
             </a:r>
-            <a:endParaRPr lang="" altLang="en-GB"/>
+            <a:endParaRPr lang="en-US" altLang="en-GB"/>
           </a:p>
           <a:p>
             <a:pPr lvl="1"/>
             <a:r>
-              <a:rPr lang="" altLang="en-GB"/>
+              <a:rPr lang="en-US" altLang="en-GB"/>
               <a:t>Diffuse</a:t>
             </a:r>
-            <a:endParaRPr lang="" altLang="en-GB"/>
+            <a:endParaRPr lang="en-US" altLang="en-GB"/>
           </a:p>
           <a:p>
             <a:pPr lvl="1"/>
             <a:r>
-              <a:rPr lang="" altLang="en-GB"/>
+              <a:rPr lang="en-US" altLang="en-GB"/>
               <a:t>Reflect</a:t>
             </a:r>
-            <a:endParaRPr lang="" altLang="en-GB"/>
+            <a:endParaRPr lang="en-US" altLang="en-GB"/>
           </a:p>
           <a:p>
             <a:pPr lvl="1"/>
             <a:r>
-              <a:rPr lang="" altLang="en-GB"/>
+              <a:rPr lang="en-US" altLang="en-GB"/>
               <a:t>Reflect and refract </a:t>
             </a:r>
-            <a:endParaRPr lang="" altLang="en-GB"/>
+            <a:endParaRPr lang="en-US" altLang="en-GB"/>
           </a:p>
           <a:p>
             <a:pPr lvl="1"/>
             <a:r>
-              <a:rPr lang="" altLang="en-GB"/>
+              <a:rPr lang="en-US" altLang="en-GB"/>
               <a:t>Phong </a:t>
             </a:r>
-            <a:endParaRPr lang="" altLang="en-GB"/>
+            <a:endParaRPr lang="en-US" altLang="en-GB"/>
           </a:p>
           <a:p>
             <a:pPr lvl="0"/>
             <a:r>
-              <a:rPr lang="" altLang="en-GB"/>
+              <a:rPr lang="en-US" altLang="en-GB"/>
               <a:t>It reads scene data from CLI in this order</a:t>
             </a:r>
-            <a:endParaRPr lang="" altLang="en-GB"/>
+            <a:endParaRPr lang="en-US" altLang="en-GB"/>
           </a:p>
           <a:p>
             <a:pPr lvl="1"/>
             <a:r>
-              <a:rPr lang="" altLang="en-GB"/>
+              <a:rPr lang="en-US" altLang="en-GB"/>
               <a:t>Scene data file .sod - it specifices things such as resoluion, lighting in the scene etc.</a:t>
             </a:r>
-            <a:endParaRPr lang="" altLang="en-GB"/>
+            <a:endParaRPr lang="en-US" altLang="en-GB"/>
           </a:p>
           <a:p>
             <a:pPr lvl="1"/>
             <a:r>
-              <a:rPr lang="" altLang="en-GB"/>
+              <a:rPr lang="en-US" altLang="en-GB"/>
               <a:t>How many objects are in the scne</a:t>
             </a:r>
-            <a:endParaRPr lang="" altLang="en-GB"/>
+            <a:endParaRPr lang="en-US" altLang="en-GB"/>
           </a:p>
           <a:p>
             <a:pPr lvl="1"/>
             <a:r>
-              <a:rPr lang="" altLang="en-GB"/>
+              <a:rPr lang="en-US" altLang="en-GB"/>
               <a:t>Geometry descreption file .geo - contains vertex, texture and other data</a:t>
             </a:r>
-            <a:endParaRPr lang="" altLang="en-GB"/>
+            <a:endParaRPr lang="en-US" altLang="en-GB"/>
           </a:p>
           <a:p>
             <a:pPr lvl="1"/>
             <a:r>
-              <a:rPr lang="" altLang="en-GB"/>
+              <a:rPr lang="en-US" altLang="en-GB"/>
               <a:t>Object data file .ood - contains </a:t>
             </a:r>
-            <a:endParaRPr lang="" altLang="en-GB"/>
+            <a:endParaRPr lang="en-US" altLang="en-GB"/>
           </a:p>
         </p:txBody>
       </p:sp>
@@ -13524,10 +15079,10 @@
           <a:bodyPr/>
           <a:p>
             <a:r>
-              <a:rPr lang="" altLang="en-US"/>
+              <a:rPr lang="en-US" altLang="en-US"/>
               <a:t>Scene Data File .sod</a:t>
             </a:r>
-            <a:endParaRPr lang="" altLang="en-US"/>
+            <a:endParaRPr lang="en-US" altLang="en-US"/>
           </a:p>
         </p:txBody>
       </p:sp>
@@ -13554,137 +15109,57 @@
           <a:p>
             <a:r>
               <a:rPr lang="en-US"/>
-              <a:t>1920</a:t>
-            </a:r>
-            <a:r>
-              <a:rPr lang="" altLang="en-US"/>
+              <a:t>options-&gt;width:	Set resolution width</a:t>
+            </a:r>
+            <a:endParaRPr lang="en-US"/>
+          </a:p>
+          <a:p>
+            <a:r>
+              <a:rPr lang="en-US"/>
+              <a:t>options-&gt;height:	</a:t>
+            </a:r>
+            <a:r>
+              <a:rPr lang="en-US" altLang="en-US"/>
               <a:t> </a:t>
             </a:r>
             <a:r>
               <a:rPr lang="en-US"/>
-              <a:t>width</a:t>
-            </a:r>
-            <a:r>
-              <a:rPr lang="" altLang="en-US"/>
-              <a:t> </a:t>
-            </a:r>
+              <a:t>Set resolution height</a:t>
+            </a:r>
+            <a:endParaRPr lang="en-US"/>
+          </a:p>
+          <a:p>
             <a:r>
               <a:rPr lang="en-US"/>
-              <a:t>// options-&gt;width:	Set resolution width</a:t>
+              <a:t>options-&gt;fov: Feild of view changes how much of the scene is visible </a:t>
             </a:r>
             <a:endParaRPr lang="en-US"/>
           </a:p>
           <a:p>
             <a:r>
               <a:rPr lang="en-US"/>
-              <a:t>1080</a:t>
-            </a:r>
-            <a:r>
-              <a:rPr lang="" altLang="en-US"/>
-              <a:t> </a:t>
-            </a:r>
+              <a:t>options-&gt;backgroundColor: Set background colour when no intersection occurs </a:t>
+            </a:r>
+            <a:endParaRPr lang="en-US"/>
+          </a:p>
+          <a:p>
             <a:r>
               <a:rPr lang="en-US"/>
-              <a:t>height</a:t>
-            </a:r>
-            <a:r>
-              <a:rPr lang="" altLang="en-US"/>
-              <a:t> </a:t>
-            </a:r>
+              <a:t>options-&gt;camera to world: Set the camera to a position in the scene</a:t>
+            </a:r>
+            <a:endParaRPr lang="en-US"/>
+          </a:p>
+          <a:p>
             <a:r>
               <a:rPr lang="en-US"/>
-              <a:t>// options-&gt;height:	Set resolution height</a:t>
+              <a:t>options-&gt;bias: Sets shadow bias </a:t>
             </a:r>
             <a:endParaRPr lang="en-US"/>
           </a:p>
           <a:p>
             <a:r>
               <a:rPr lang="en-US"/>
-              <a:t>90</a:t>
-            </a:r>
-            <a:r>
-              <a:rPr lang="" altLang="en-US"/>
-              <a:t> </a:t>
-            </a:r>
-            <a:r>
-              <a:rPr lang="en-US"/>
-              <a:t>FOV</a:t>
-            </a:r>
-            <a:r>
-              <a:rPr lang="" altLang="en-US"/>
-              <a:t> </a:t>
-            </a:r>
-            <a:r>
-              <a:rPr lang="en-US"/>
-              <a:t>// options-&gt;fov: Feild of view changes how much of the scene is visible </a:t>
-            </a:r>
-            <a:endParaRPr lang="en-US"/>
-          </a:p>
-          <a:p>
-            <a:r>
-              <a:rPr lang="en-US"/>
-              <a:t>0.235294 0.67451 0.843137	kDefaultBackgroundColor	// options-&gt;backgroundColor: Set background colour when no intersection occurs </a:t>
-            </a:r>
-            <a:endParaRPr lang="en-US"/>
-          </a:p>
-          <a:p>
-            <a:r>
-              <a:rPr lang="en-US"/>
-              <a:t>Camera 2 world no default</a:t>
-            </a:r>
-            <a:r>
-              <a:rPr lang="" altLang="en-US"/>
-              <a:t> </a:t>
-            </a:r>
-            <a:r>
-              <a:rPr lang="en-US"/>
-              <a:t>// options-&gt;camera to world: Set the camera to a position in the scene</a:t>
-            </a:r>
-            <a:endParaRPr lang="en-US"/>
-          </a:p>
-          <a:p>
-            <a:r>
-              <a:rPr lang="en-US"/>
-              <a:t>0.0001</a:t>
-            </a:r>
-            <a:r>
-              <a:rPr lang="" altLang="en-US"/>
-              <a:t> </a:t>
-            </a:r>
-            <a:r>
-              <a:rPr lang="en-US"/>
-              <a:t>Bias</a:t>
-            </a:r>
-            <a:r>
-              <a:rPr lang="" altLang="en-US"/>
-              <a:t> </a:t>
-            </a:r>
-            <a:r>
-              <a:rPr lang="en-US"/>
-              <a:t>// options-&gt;bias: Sets shadow bias </a:t>
-            </a:r>
-            <a:endParaRPr lang="en-US"/>
-          </a:p>
-          <a:p>
-            <a:r>
-              <a:rPr lang="en-US"/>
-              <a:t>4</a:t>
-            </a:r>
-            <a:r>
-              <a:rPr lang="" altLang="en-US"/>
-              <a:t> </a:t>
-            </a:r>
-            <a:r>
-              <a:rPr lang="en-US"/>
-              <a:t>Max Depth</a:t>
-            </a:r>
-            <a:r>
-              <a:rPr lang="" altLang="en-US"/>
-              <a:t> </a:t>
-            </a:r>
-            <a:r>
-              <a:rPr lang="en-US"/>
-              <a:t>// options-&gt;maxDepth: Sets a limit to how many rays we "chase" to find an objects contribution</a:t>
+              <a:t>options-&gt;maxDepth: Sets a limit to how many rays we "chase" to find an objects contribution</a:t>
             </a:r>
             <a:endParaRPr lang="en-US"/>
           </a:p>
@@ -13694,7 +15169,7 @@
               <a:t>1</a:t>
             </a:r>
             <a:r>
-              <a:rPr lang="" altLang="en-US"/>
+              <a:rPr lang="en-US" altLang="en-US"/>
               <a:t> </a:t>
             </a:r>
             <a:r>
@@ -13702,7 +15177,7 @@
               <a:t>number of lights</a:t>
             </a:r>
             <a:r>
-              <a:rPr lang="" altLang="en-US"/>
+              <a:rPr lang="en-US" altLang="en-US"/>
               <a:t> </a:t>
             </a:r>
             <a:r>
@@ -13714,61 +15189,25 @@
           <a:p>
             <a:r>
               <a:rPr lang="en-US"/>
-              <a:t>0</a:t>
-            </a:r>
-            <a:r>
-              <a:rPr lang="" altLang="en-US"/>
-              <a:t>  </a:t>
-            </a:r>
+              <a:t>lightdata_struct-&gt;lighttype Type of light 0 distant 1 point</a:t>
+            </a:r>
+            <a:endParaRPr lang="en-US"/>
+          </a:p>
+          <a:p>
             <a:r>
               <a:rPr lang="en-US"/>
-              <a:t>type of light</a:t>
-            </a:r>
-            <a:r>
-              <a:rPr lang="" altLang="en-US"/>
-              <a:t> </a:t>
+              <a:t>lightdata_struct-&gt;colour Select the light colour either int or Vec3f</a:t>
+            </a:r>
+            <a:endParaRPr lang="en-US"/>
+          </a:p>
+          <a:p>
+            <a:r>
+              <a:rPr lang="en-US" altLang="en-US"/>
+              <a:t>l</a:t>
             </a:r>
             <a:r>
               <a:rPr lang="en-US"/>
-              <a:t>// lightdata_struct-&gt;lighttype Type of light 0 distant 1 point</a:t>
-            </a:r>
-            <a:endParaRPr lang="en-US"/>
-          </a:p>
-          <a:p>
-            <a:r>
-              <a:rPr lang="en-US"/>
-              <a:t>1 1 1</a:t>
-            </a:r>
-            <a:r>
-              <a:rPr lang="" altLang="en-US"/>
-              <a:t> </a:t>
-            </a:r>
-            <a:r>
-              <a:rPr lang="en-US"/>
-              <a:t>light colour</a:t>
-            </a:r>
-            <a:r>
-              <a:rPr lang="" altLang="en-US"/>
-              <a:t> </a:t>
-            </a:r>
-            <a:r>
-              <a:rPr lang="en-US"/>
-              <a:t>// lightdata_struct-&gt;colour Select the light colour either int or Vec3f</a:t>
-            </a:r>
-            <a:endParaRPr lang="en-US"/>
-          </a:p>
-          <a:p>
-            <a:r>
-              <a:rPr lang="en-US"/>
-              <a:t>1</a:t>
-            </a:r>
-            <a:r>
-              <a:rPr lang="" altLang="en-US"/>
-              <a:t> </a:t>
-            </a:r>
-            <a:r>
-              <a:rPr lang="en-US"/>
-              <a:t>light intensity	// lightdata_struct-&gt;intensity Select the light intensity 1 for distant light 500 for point light</a:t>
+              <a:t>ightdata_struct-&gt;intensity Select the light intensity 1 for distant light 500 for point light</a:t>
             </a:r>
             <a:endParaRPr lang="en-US"/>
           </a:p>
@@ -13814,10 +15253,10 @@
           <a:bodyPr/>
           <a:p>
             <a:r>
-              <a:rPr lang="" altLang="en-US"/>
+              <a:rPr lang="en-US" altLang="en-US"/>
               <a:t>Geometry data file .geo</a:t>
             </a:r>
-            <a:endParaRPr lang="" altLang="en-US"/>
+            <a:endParaRPr lang="en-US" altLang="en-US"/>
           </a:p>
         </p:txBody>
       </p:sp>
@@ -13909,10 +15348,10 @@
           <a:bodyPr/>
           <a:p>
             <a:r>
-              <a:rPr lang="" altLang="en-US"/>
+              <a:rPr lang="en-US" altLang="en-US"/>
               <a:t>Object Data File .ood</a:t>
             </a:r>
-            <a:endParaRPr lang="" altLang="en-US"/>
+            <a:endParaRPr lang="en-US" altLang="en-US"/>
           </a:p>
         </p:txBody>
       </p:sp>
@@ -13943,115 +15382,75 @@
           </a:p>
           <a:p>
             <a:r>
+              <a:rPr lang="en-US" altLang="en-US"/>
+              <a:t>O</a:t>
+            </a:r>
+            <a:r>
               <a:rPr lang="en-US"/>
-              <a:t>kDiffuse	</a:t>
-            </a:r>
-            <a:r>
-              <a:rPr lang="" altLang="en-US"/>
-              <a:t> </a:t>
-            </a:r>
+              <a:t>bject-&gt;type: Set the material type</a:t>
+            </a:r>
+            <a:endParaRPr lang="en-US"/>
+          </a:p>
+          <a:p>
+            <a:pPr lvl="1"/>
             <a:r>
               <a:rPr lang="en-US"/>
-              <a:t>Type </a:t>
-            </a:r>
-            <a:r>
-              <a:rPr lang="" altLang="en-US"/>
-              <a:t> </a:t>
+              <a:t>(0-kDiffuse, 1-kReflection, 2-kReflectionAndRefraction, 3-kPhong)</a:t>
+            </a:r>
+            <a:endParaRPr lang="en-US"/>
+          </a:p>
+          <a:p>
+            <a:r>
+              <a:rPr lang="en-US" altLang="en-US"/>
+              <a:t>O</a:t>
             </a:r>
             <a:r>
               <a:rPr lang="en-US"/>
-              <a:t>// object-&gt;type: Set the material type(0-kDiffuse, 1-kReflection, 2-kReflectionAndRefraction, 3-kPhong)</a:t>
+              <a:t>bject-&gt;ior: Index of refraction (also sometimes referred to as ior)</a:t>
             </a:r>
             <a:endParaRPr lang="en-US"/>
           </a:p>
           <a:p>
             <a:r>
+              <a:rPr lang="en-US" altLang="en-US"/>
+              <a:t>O</a:t>
+            </a:r>
+            <a:r>
               <a:rPr lang="en-US"/>
-              <a:t>1</a:t>
-            </a:r>
-            <a:r>
-              <a:rPr lang="" altLang="en-US"/>
-              <a:t> </a:t>
+              <a:t>bject-&gt;albedo: albedo = reflect light / incident light</a:t>
+            </a:r>
+            <a:endParaRPr lang="en-US"/>
+          </a:p>
+          <a:p>
+            <a:r>
+              <a:rPr lang="en-US" altLang="en-US"/>
+              <a:t>O</a:t>
             </a:r>
             <a:r>
               <a:rPr lang="en-US"/>
-              <a:t>IOR</a:t>
-            </a:r>
-            <a:r>
-              <a:rPr lang="" altLang="en-US"/>
-              <a:t> </a:t>
+              <a:t>bject-&gt;kd: phong model diffuse weight</a:t>
+            </a:r>
+            <a:endParaRPr lang="en-US"/>
+          </a:p>
+          <a:p>
+            <a:r>
+              <a:rPr lang="en-US" altLang="en-US"/>
+              <a:t>O</a:t>
             </a:r>
             <a:r>
               <a:rPr lang="en-US"/>
-              <a:t>	// object-&gt;ior: Index of refraction (also sometimes referred to as ior)</a:t>
+              <a:t>bject-&gt;ks: phong model specular weight, control the size of matte lighting spot</a:t>
             </a:r>
             <a:endParaRPr lang="en-US"/>
           </a:p>
           <a:p>
             <a:r>
+              <a:rPr lang="en-US" altLang="en-US"/>
+              <a:t>O</a:t>
+            </a:r>
+            <a:r>
               <a:rPr lang="en-US"/>
-              <a:t>0.18 0.18 0.18	</a:t>
-            </a:r>
-            <a:r>
-              <a:rPr lang="" altLang="en-US"/>
-              <a:t> </a:t>
-            </a:r>
-            <a:r>
-              <a:rPr lang="en-US"/>
-              <a:t>Albedo	// object-&gt;albedo: albedo = reflect light / incident light</a:t>
-            </a:r>
-            <a:endParaRPr lang="en-US"/>
-          </a:p>
-          <a:p>
-            <a:r>
-              <a:rPr lang="en-US"/>
-              <a:t>0.8</a:t>
-            </a:r>
-            <a:r>
-              <a:rPr lang="" altLang="en-US"/>
-              <a:t> </a:t>
-            </a:r>
-            <a:r>
-              <a:rPr lang="en-US"/>
-              <a:t>Kd</a:t>
-            </a:r>
-            <a:r>
-              <a:rPr lang="" altLang="en-US"/>
-              <a:t> </a:t>
-            </a:r>
-            <a:r>
-              <a:rPr lang="en-US"/>
-              <a:t>// object-&gt;kd: phong model diffuse weight</a:t>
-            </a:r>
-            <a:endParaRPr lang="en-US"/>
-          </a:p>
-          <a:p>
-            <a:r>
-              <a:rPr lang="en-US"/>
-              <a:t>0.2</a:t>
-            </a:r>
-            <a:r>
-              <a:rPr lang="" altLang="en-US"/>
-              <a:t> </a:t>
-            </a:r>
-            <a:r>
-              <a:rPr lang="en-US"/>
-              <a:t>Ks // object-&gt;ks: phong model specular weight, control the size of matte lighting spot</a:t>
-            </a:r>
-            <a:endParaRPr lang="en-US"/>
-          </a:p>
-          <a:p>
-            <a:r>
-              <a:rPr lang="en-US"/>
-              <a:t>10</a:t>
-            </a:r>
-            <a:r>
-              <a:rPr lang="" altLang="en-US"/>
-              <a:t> </a:t>
-            </a:r>
-            <a:r>
-              <a:rPr lang="en-US"/>
-              <a:t>n	// object-&gt;n: phong specular exponent, control the size of specular spot</a:t>
+              <a:t>bject-&gt;n: phong specular exponent, control the size of specular spot</a:t>
             </a:r>
             <a:endParaRPr lang="en-US"/>
           </a:p>
@@ -14090,10 +15489,10 @@
           <a:bodyPr/>
           <a:p>
             <a:r>
-              <a:rPr lang="" altLang="en-US"/>
-              <a:t>Data structures</a:t>
-            </a:r>
-            <a:endParaRPr lang="" altLang="en-US"/>
+              <a:rPr lang="en-US" altLang="en-US"/>
+              <a:t>Data Structures</a:t>
+            </a:r>
+            <a:endParaRPr lang="en-US" altLang="en-US"/>
           </a:p>
         </p:txBody>
       </p:sp>
@@ -14107,11 +15506,34 @@
             <p:ph idx="1"/>
           </p:nvPr>
         </p:nvSpPr>
-        <p:spPr/>
+        <p:spPr>
+          <a:xfrm>
+            <a:off x="520065" y="2266950"/>
+            <a:ext cx="11150600" cy="4313555"/>
+          </a:xfrm>
+        </p:spPr>
         <p:txBody>
           <a:bodyPr/>
           <a:p>
-            <a:endParaRPr lang="en-US"/>
+            <a:r>
+              <a:rPr lang="en-US" altLang="en-US"/>
+              <a:t>Data are parsed with the help of a simple parser according to the file formats mentioned above </a:t>
+            </a:r>
+            <a:endParaRPr lang="en-US" altLang="en-US"/>
+          </a:p>
+          <a:p>
+            <a:r>
+              <a:rPr lang="en-US" altLang="en-US"/>
+              <a:t>The data are stored in memory for the time being </a:t>
+            </a:r>
+            <a:endParaRPr lang="en-US" altLang="en-US"/>
+          </a:p>
+          <a:p>
+            <a:r>
+              <a:rPr lang="en-US" altLang="en-US"/>
+              <a:t>The framebuffer is modeled after a plane block ram as a chunck of memory </a:t>
+            </a:r>
+            <a:endParaRPr lang="en-US" altLang="en-US"/>
           </a:p>
         </p:txBody>
       </p:sp>
@@ -14148,10 +15570,10 @@
           <a:bodyPr/>
           <a:p>
             <a:r>
-              <a:rPr lang="" altLang="en-US"/>
-              <a:t>Data parsing</a:t>
-            </a:r>
-            <a:endParaRPr lang="" altLang="en-US"/>
+              <a:rPr lang="en-US" altLang="en-US"/>
+              <a:t>Data Structures</a:t>
+            </a:r>
+            <a:endParaRPr lang="en-US" altLang="en-US"/>
           </a:p>
         </p:txBody>
       </p:sp>
@@ -14165,11 +15587,120 @@
             <p:ph idx="1"/>
           </p:nvPr>
         </p:nvSpPr>
-        <p:spPr/>
+        <p:spPr>
+          <a:xfrm>
+            <a:off x="427355" y="2273935"/>
+            <a:ext cx="11318240" cy="4390390"/>
+          </a:xfrm>
+        </p:spPr>
         <p:txBody>
-          <a:bodyPr/>
-          <a:p>
-            <a:endParaRPr lang="en-US"/>
+          <a:bodyPr>
+            <a:normAutofit lnSpcReduction="20000"/>
+          </a:bodyPr>
+          <a:p>
+            <a:r>
+              <a:rPr lang="en-US" altLang="en-US"/>
+              <a:t>Rendering the scene is taken care of a double loop that itterates each pixel ( render )</a:t>
+            </a:r>
+            <a:endParaRPr lang="en-US" altLang="en-US"/>
+          </a:p>
+          <a:p>
+            <a:r>
+              <a:rPr lang="en-US" altLang="en-US"/>
+              <a:t>For each pixel we are casting a Ray ( cast ray )</a:t>
+            </a:r>
+            <a:endParaRPr lang="en-US" altLang="en-US"/>
+          </a:p>
+          <a:p>
+            <a:pPr lvl="1"/>
+            <a:r>
+              <a:rPr lang="en-US" altLang="en-US"/>
+              <a:t>If the ray has reached maximum depth return background colour</a:t>
+            </a:r>
+            <a:endParaRPr lang="en-US" altLang="en-US"/>
+          </a:p>
+          <a:p>
+            <a:pPr lvl="1"/>
+            <a:r>
+              <a:rPr lang="en-US" altLang="en-US"/>
+              <a:t>If not we trace the Ray to see if it intersects </a:t>
+            </a:r>
+            <a:endParaRPr lang="en-US" altLang="en-US"/>
+          </a:p>
+          <a:p>
+            <a:pPr lvl="0"/>
+            <a:r>
+              <a:rPr lang="en-US" altLang="en-US"/>
+              <a:t>Trace the Ray by itterating through the list of objects ( trace )</a:t>
+            </a:r>
+            <a:endParaRPr lang="en-US" altLang="en-US"/>
+          </a:p>
+          <a:p>
+            <a:pPr lvl="1"/>
+            <a:r>
+              <a:rPr lang="en-US" altLang="en-US" sz="1600"/>
+              <a:t>If the Ray intersects, is nearer, the Ray type is not shodow and the object is not reflecting and refracting then we record its</a:t>
+            </a:r>
+            <a:endParaRPr lang="en-US" altLang="en-US" sz="1600"/>
+          </a:p>
+          <a:p>
+            <a:pPr lvl="2"/>
+            <a:r>
+              <a:rPr lang="en-US" altLang="en-US" sz="1400"/>
+              <a:t>Distance </a:t>
+            </a:r>
+            <a:endParaRPr lang="en-US" altLang="en-US" sz="1400"/>
+          </a:p>
+          <a:p>
+            <a:pPr lvl="2"/>
+            <a:r>
+              <a:rPr lang="en-US" altLang="en-US" sz="1400"/>
+              <a:t>Index</a:t>
+            </a:r>
+            <a:endParaRPr lang="en-US" altLang="en-US" sz="1400"/>
+          </a:p>
+          <a:p>
+            <a:pPr lvl="2"/>
+            <a:r>
+              <a:rPr lang="en-US" altLang="en-US"/>
+              <a:t>u, v coordinates</a:t>
+            </a:r>
+            <a:endParaRPr lang="en-US" altLang="en-US"/>
+          </a:p>
+          <a:p>
+            <a:pPr lvl="0"/>
+            <a:r>
+              <a:rPr lang="en-US" altLang="en-US"/>
+              <a:t>Test intersection with every triangle in the mesh of an object ( intersect )</a:t>
+            </a:r>
+            <a:endParaRPr lang="en-US" altLang="en-US"/>
+          </a:p>
+          <a:p>
+            <a:pPr lvl="1"/>
+            <a:r>
+              <a:rPr lang="en-US" altLang="en-US"/>
+              <a:t>Conduct the same check for distance here </a:t>
+            </a:r>
+            <a:endParaRPr lang="en-US" altLang="en-US"/>
+          </a:p>
+          <a:p>
+            <a:pPr lvl="0"/>
+            <a:r>
+              <a:rPr lang="en-US" altLang="en-US"/>
+              <a:t>Finally perform the Ray triangle intersection and return u,v coordinates and distance ( ray Triangle Intersect )</a:t>
+            </a:r>
+            <a:endParaRPr lang="en-US" altLang="en-US"/>
+          </a:p>
+          <a:p>
+            <a:pPr lvl="2"/>
+            <a:endParaRPr lang="en-US" altLang="en-US"/>
+          </a:p>
+          <a:p>
+            <a:pPr lvl="1"/>
+            <a:endParaRPr lang="en-US" altLang="en-US"/>
+          </a:p>
+          <a:p>
+            <a:endParaRPr lang="en-US" altLang="en-US"/>
           </a:p>
         </p:txBody>
       </p:sp>
@@ -14206,10 +15737,10 @@
           <a:bodyPr/>
           <a:p>
             <a:r>
-              <a:rPr lang="" altLang="en-US"/>
-              <a:t>Ray triangle intersection</a:t>
-            </a:r>
-            <a:endParaRPr lang="" altLang="en-US"/>
+              <a:rPr lang="en-US" altLang="en-US"/>
+              <a:t>Render</a:t>
+            </a:r>
+            <a:endParaRPr lang="en-US" altLang="en-US"/>
           </a:p>
         </p:txBody>
       </p:sp>
@@ -14223,11 +15754,47 @@
             <p:ph idx="1"/>
           </p:nvPr>
         </p:nvSpPr>
-        <p:spPr/>
+        <p:spPr>
+          <a:xfrm>
+            <a:off x="472440" y="2251075"/>
+            <a:ext cx="11119485" cy="4427855"/>
+          </a:xfrm>
+        </p:spPr>
         <p:txBody>
           <a:bodyPr/>
           <a:p>
-            <a:endParaRPr lang="en-US"/>
+            <a:r>
+              <a:rPr lang="en-US" altLang="en-US"/>
+              <a:t>This is the base render function, it serves the perpose of culculating the coodinates of the pixels in order for the ray to pass buy the center of the pixel </a:t>
+            </a:r>
+            <a:endParaRPr lang="en-US" altLang="en-US"/>
+          </a:p>
+          <a:p>
+            <a:r>
+              <a:rPr lang="en-US" altLang="en-US"/>
+              <a:t>Multiply the pixel coordinates with the camera to world matrix to generate the rays from the desired point in space</a:t>
+            </a:r>
+            <a:endParaRPr lang="en-US" altLang="en-US"/>
+          </a:p>
+          <a:p>
+            <a:r>
+              <a:rPr lang="" altLang="en-US"/>
+              <a:t>For each pixel we culculate a direction nad sent it to be cast as a Ray</a:t>
+            </a:r>
+            <a:endParaRPr lang="" altLang="en-US"/>
+          </a:p>
+          <a:p>
+            <a:r>
+              <a:rPr lang="" altLang="en-US"/>
+              <a:t>At the end of this proccess we build the final image </a:t>
+            </a:r>
+            <a:endParaRPr lang="" altLang="en-US"/>
+          </a:p>
+          <a:p>
+            <a:pPr marL="0" indent="0">
+              <a:buNone/>
+            </a:pPr>
+            <a:endParaRPr lang="" altLang="en-US"/>
           </a:p>
         </p:txBody>
       </p:sp>
@@ -14264,10 +15831,10 @@
           <a:bodyPr/>
           <a:p>
             <a:r>
-              <a:rPr lang="" altLang="en-US"/>
-              <a:t>Polygon meshes - triangle mesh</a:t>
-            </a:r>
-            <a:endParaRPr lang="" altLang="en-US"/>
+              <a:rPr lang="en-US" altLang="en-US"/>
+              <a:t>Cast the ray</a:t>
+            </a:r>
+            <a:endParaRPr lang="en-US" altLang="en-US"/>
           </a:p>
         </p:txBody>
       </p:sp>
@@ -14283,14 +15850,68 @@
         </p:nvSpPr>
         <p:spPr>
           <a:xfrm>
-            <a:off x="504190" y="2364105"/>
-            <a:ext cx="11136630" cy="4238625"/>
+            <a:off x="472440" y="2273935"/>
+            <a:ext cx="11180445" cy="4198620"/>
           </a:xfrm>
         </p:spPr>
         <p:txBody>
           <a:bodyPr/>
           <a:p>
-            <a:endParaRPr lang="en-US"/>
+            <a:r>
+              <a:rPr lang="en-US" altLang="en-US"/>
+              <a:t>This is where if there is an intersection point it gets coloured based on its type</a:t>
+            </a:r>
+            <a:r>
+              <a:rPr lang="" altLang="en-US"/>
+              <a:t> whitch we will discus afterwords</a:t>
+            </a:r>
+            <a:r>
+              <a:rPr lang="en-US" altLang="en-US"/>
+              <a:t> </a:t>
+            </a:r>
+            <a:endParaRPr lang="en-US" altLang="en-US"/>
+          </a:p>
+          <a:p>
+            <a:pPr lvl="1"/>
+            <a:r>
+              <a:rPr lang="en-US" altLang="en-US"/>
+              <a:t>Diffuse </a:t>
+            </a:r>
+            <a:endParaRPr lang="en-US" altLang="en-US"/>
+          </a:p>
+          <a:p>
+            <a:pPr lvl="1"/>
+            <a:r>
+              <a:rPr lang="en-US" altLang="en-US"/>
+              <a:t>Reflect</a:t>
+            </a:r>
+            <a:endParaRPr lang="en-US" altLang="en-US"/>
+          </a:p>
+          <a:p>
+            <a:pPr lvl="1"/>
+            <a:r>
+              <a:rPr lang="en-US" altLang="en-GB">
+                <a:sym typeface="+mn-ea"/>
+              </a:rPr>
+              <a:t>Reflect and refract </a:t>
+            </a:r>
+            <a:endParaRPr lang="en-US" altLang="en-GB"/>
+          </a:p>
+          <a:p>
+            <a:pPr lvl="1"/>
+            <a:r>
+              <a:rPr lang="en-US" altLang="en-US"/>
+              <a:t>Phong </a:t>
+            </a:r>
+            <a:endParaRPr lang="en-US" altLang="en-US"/>
+          </a:p>
+          <a:p>
+            <a:pPr lvl="0"/>
+            <a:endParaRPr lang="en-US" altLang="en-US"/>
+          </a:p>
+          <a:p>
+            <a:pPr lvl="0"/>
+            <a:endParaRPr lang="en-US" altLang="en-US"/>
           </a:p>
         </p:txBody>
       </p:sp>

</xml_diff>

<commit_message>
further improoving all materials scene
</commit_message>
<xml_diff>
--- a/documentation/software/Base_render_system_documentation.pptx
+++ b/documentation/software/Base_render_system_documentation.pptx
@@ -5,10 +5,10 @@
     <p:sldMasterId id="2147483648" r:id="rId1"/>
   </p:sldMasterIdLst>
   <p:notesMasterIdLst>
-    <p:notesMasterId r:id="rId20"/>
+    <p:notesMasterId r:id="rId21"/>
   </p:notesMasterIdLst>
   <p:handoutMasterIdLst>
-    <p:handoutMasterId r:id="rId21"/>
+    <p:handoutMasterId r:id="rId22"/>
   </p:handoutMasterIdLst>
   <p:sldIdLst>
     <p:sldId id="256" r:id="rId3"/>
@@ -18,16 +18,17 @@
     <p:sldId id="260" r:id="rId7"/>
     <p:sldId id="265" r:id="rId8"/>
     <p:sldId id="263" r:id="rId9"/>
-    <p:sldId id="271" r:id="rId10"/>
-    <p:sldId id="270" r:id="rId11"/>
-    <p:sldId id="276" r:id="rId12"/>
-    <p:sldId id="266" r:id="rId13"/>
-    <p:sldId id="262" r:id="rId14"/>
-    <p:sldId id="275" r:id="rId15"/>
-    <p:sldId id="277" r:id="rId16"/>
-    <p:sldId id="278" r:id="rId17"/>
-    <p:sldId id="279" r:id="rId18"/>
-    <p:sldId id="280" r:id="rId19"/>
+    <p:sldId id="284" r:id="rId10"/>
+    <p:sldId id="271" r:id="rId11"/>
+    <p:sldId id="270" r:id="rId12"/>
+    <p:sldId id="276" r:id="rId13"/>
+    <p:sldId id="266" r:id="rId14"/>
+    <p:sldId id="262" r:id="rId15"/>
+    <p:sldId id="275" r:id="rId16"/>
+    <p:sldId id="277" r:id="rId17"/>
+    <p:sldId id="278" r:id="rId18"/>
+    <p:sldId id="279" r:id="rId19"/>
+    <p:sldId id="280" r:id="rId20"/>
   </p:sldIdLst>
   <p:sldSz cx="12192000" cy="6858000"/>
   <p:notesSz cx="6858000" cy="9144000"/>
@@ -14023,7 +14024,7 @@
         <p:spPr>
           <a:xfrm>
             <a:off x="472440" y="2273935"/>
-            <a:ext cx="5020310" cy="4198620"/>
+            <a:ext cx="11180445" cy="4198620"/>
           </a:xfrm>
         </p:spPr>
         <p:txBody>
@@ -14031,42 +14032,54 @@
           <a:p>
             <a:r>
               <a:rPr lang="en-US" altLang="en-US"/>
-              <a:t>Experiments were run with multiple scenes show that although the scenes utilize different effects the majority of execution time was spend on the Ray Triangle intersection ( Pending more investigation</a:t>
+              <a:t>This is where if there is an intersection point it gets coloured based on its type which we will discus afterwords </a:t>
             </a:r>
             <a:endParaRPr lang="en-US" altLang="en-US"/>
           </a:p>
           <a:p>
-            <a:r>
-              <a:rPr lang="" altLang="en-US"/>
-              <a:t>Exept for the intersect function all other opprations belong in the rayTriangleIntersect function</a:t>
+            <a:pPr lvl="1"/>
+            <a:r>
+              <a:rPr lang="en-US" altLang="en-US"/>
+              <a:t>Diffuse </a:t>
             </a:r>
             <a:endParaRPr lang="en-US" altLang="en-US"/>
           </a:p>
           <a:p>
+            <a:pPr lvl="1"/>
+            <a:r>
+              <a:rPr lang="en-US" altLang="en-US"/>
+              <a:t>Reflect</a:t>
+            </a:r>
+            <a:endParaRPr lang="en-US" altLang="en-US"/>
+          </a:p>
+          <a:p>
+            <a:pPr lvl="1"/>
+            <a:r>
+              <a:rPr lang="en-US" altLang="en-GB">
+                <a:sym typeface="+mn-ea"/>
+              </a:rPr>
+              <a:t>Reflect and refract </a:t>
+            </a:r>
+            <a:endParaRPr lang="en-US" altLang="en-GB"/>
+          </a:p>
+          <a:p>
+            <a:pPr lvl="1"/>
+            <a:r>
+              <a:rPr lang="en-US" altLang="en-US"/>
+              <a:t>Phong </a:t>
+            </a:r>
             <a:endParaRPr lang="en-US" altLang="en-US"/>
           </a:p>
           <a:p>
             <a:pPr lvl="0"/>
             <a:endParaRPr lang="en-US" altLang="en-US"/>
           </a:p>
+          <a:p>
+            <a:pPr lvl="0"/>
+            <a:endParaRPr lang="en-US" altLang="en-US"/>
+          </a:p>
         </p:txBody>
       </p:sp>
-      <p:graphicFrame>
-        <p:nvGraphicFramePr>
-          <p:cNvPr id="4" name="Chart 3"/>
-          <p:cNvGraphicFramePr/>
-          <p:nvPr/>
-        </p:nvGraphicFramePr>
-        <p:xfrm>
-          <a:off x="5493385" y="2273618"/>
-          <a:ext cx="6159500" cy="4346575"/>
-        </p:xfrm>
-        <a:graphic>
-          <a:graphicData uri="http://schemas.openxmlformats.org/drawingml/2006/chart">
-            <c:chart xmlns:c="http://schemas.openxmlformats.org/drawingml/2006/chart" xmlns:r="http://schemas.openxmlformats.org/officeDocument/2006/relationships" r:id="rId1"/>
-          </a:graphicData>
-        </a:graphic>
-      </p:graphicFrame>
     </p:spTree>
   </p:cSld>
   <p:clrMapOvr>
@@ -14101,7 +14114,7 @@
           <a:p>
             <a:r>
               <a:rPr lang="en-US" altLang="en-US"/>
-              <a:t>Trace the ray</a:t>
+              <a:t>Cast the ray</a:t>
             </a:r>
             <a:endParaRPr lang="en-US" altLang="en-US"/>
           </a:p>
@@ -14119,8 +14132,8 @@
         </p:nvSpPr>
         <p:spPr>
           <a:xfrm>
-            <a:off x="441325" y="2282190"/>
-            <a:ext cx="11304270" cy="4478020"/>
+            <a:off x="472440" y="2273935"/>
+            <a:ext cx="5020310" cy="4198620"/>
           </a:xfrm>
         </p:spPr>
         <p:txBody>
@@ -14128,37 +14141,22 @@
           <a:p>
             <a:r>
               <a:rPr lang="en-US" altLang="en-US"/>
-              <a:t>For each object in the scene we check whenever they intersect with a Ray </a:t>
+              <a:t>Experiments were run with multiple scenes show that although the scenes utilize different effects the majority of execution time was spend on the Ray Triangle intersection ( Pending more investigation</a:t>
             </a:r>
             <a:endParaRPr lang="en-US" altLang="en-US"/>
           </a:p>
           <a:p>
-            <a:pPr lvl="1"/>
             <a:r>
               <a:rPr lang="en-US" altLang="en-US"/>
-              <a:t>That means for each object we check all the triangles in its mesh and we keep track of the nearest triangle that was intersected </a:t>
+              <a:t>Except for the intersect function all other operations belong in the rayTriangleIntersect function</a:t>
             </a:r>
             <a:endParaRPr lang="en-US" altLang="en-US"/>
           </a:p>
           <a:p>
-            <a:r>
-              <a:rPr lang="en-US" altLang="en-US"/>
-              <a:t>Then by checking the distance to that intersection point we can select or discard it </a:t>
-            </a:r>
             <a:endParaRPr lang="en-US" altLang="en-US"/>
           </a:p>
           <a:p>
-            <a:r>
-              <a:rPr lang="en-US" altLang="en-US"/>
-              <a:t>If the ray type is shadow or the object is reflective and refractive we skip</a:t>
-            </a:r>
-            <a:endParaRPr lang="en-US" altLang="en-US"/>
-          </a:p>
-          <a:p>
-            <a:r>
-              <a:rPr lang="en-US" altLang="en-US"/>
-              <a:t>This can be further optimized by introdusing BVH data structures to hold the objejcts </a:t>
-            </a:r>
+            <a:pPr lvl="0"/>
             <a:endParaRPr lang="en-US" altLang="en-US"/>
           </a:p>
         </p:txBody>
@@ -14197,7 +14195,7 @@
           <a:p>
             <a:r>
               <a:rPr lang="en-US" altLang="en-US"/>
-              <a:t>Ray triangle intersection</a:t>
+              <a:t>Trace the ray</a:t>
             </a:r>
             <a:endParaRPr lang="en-US" altLang="en-US"/>
           </a:p>
@@ -14215,8 +14213,8 @@
         </p:nvSpPr>
         <p:spPr>
           <a:xfrm>
-            <a:off x="445135" y="2275205"/>
-            <a:ext cx="11225530" cy="4327525"/>
+            <a:off x="441325" y="2282190"/>
+            <a:ext cx="11304270" cy="4478020"/>
           </a:xfrm>
         </p:spPr>
         <p:txBody>
@@ -14224,62 +14222,36 @@
           <a:p>
             <a:r>
               <a:rPr lang="en-US" altLang="en-US"/>
-              <a:t>Ray triangle intersection is found using the Möller-Trumbore algorithm </a:t>
+              <a:t>For each object in the scene we check whenever they intersect with a Ray </a:t>
             </a:r>
             <a:endParaRPr lang="en-US" altLang="en-US"/>
           </a:p>
           <a:p>
+            <a:pPr lvl="1"/>
             <a:r>
               <a:rPr lang="en-US" altLang="en-US"/>
-              <a:t>It utilized dot and cross products to evaluate the determinand of a system containg the </a:t>
+              <a:t>That means for each object we check all the triangles in its mesh and we keep track of the nearest triangle that was intersected </a:t>
             </a:r>
             <a:endParaRPr lang="en-US" altLang="en-US"/>
           </a:p>
           <a:p>
-            <a:pPr lvl="1"/>
-            <a:r>
-              <a:rPr lang="en-US" altLang="en-US" sz="1600"/>
-              <a:t>Ray origin </a:t>
-            </a:r>
-            <a:endParaRPr lang="en-US" altLang="en-US" sz="1600"/>
-          </a:p>
-          <a:p>
-            <a:pPr lvl="1"/>
             <a:r>
               <a:rPr lang="en-US" altLang="en-US"/>
-              <a:t>Ray direction</a:t>
+              <a:t>Then by checking the distance to that intersection point we can select or discard it </a:t>
             </a:r>
             <a:endParaRPr lang="en-US" altLang="en-US"/>
           </a:p>
           <a:p>
-            <a:pPr lvl="1"/>
             <a:r>
               <a:rPr lang="en-US" altLang="en-US"/>
-              <a:t>The triangle vertecies</a:t>
+              <a:t>If the ray type is shadow or the object is reflective and refractive we skip</a:t>
             </a:r>
             <a:endParaRPr lang="en-US" altLang="en-US"/>
           </a:p>
           <a:p>
-            <a:pPr lvl="0"/>
             <a:r>
               <a:rPr lang="en-US" altLang="en-US"/>
-              <a:t>and solves for </a:t>
-            </a:r>
-            <a:endParaRPr lang="en-US" altLang="en-US"/>
-          </a:p>
-          <a:p>
-            <a:pPr lvl="1"/>
-            <a:r>
-              <a:rPr lang="en-US" altLang="en-US"/>
-              <a:t>The distance from the Ray origin</a:t>
-            </a:r>
-            <a:endParaRPr lang="en-US" altLang="en-US"/>
-          </a:p>
-          <a:p>
-            <a:pPr lvl="1"/>
-            <a:r>
-              <a:rPr lang="en-US" altLang="en-US"/>
-              <a:t>And the u,v coordinates of the intersection point</a:t>
+              <a:t>This can be further optimized by introducing BVH data structures to hold the objects </a:t>
             </a:r>
             <a:endParaRPr lang="en-US" altLang="en-US"/>
           </a:p>
@@ -14318,10 +14290,10 @@
           <a:bodyPr/>
           <a:p>
             <a:r>
-              <a:rPr lang="" altLang="en-US"/>
-              <a:t>Shading - Diffuse</a:t>
-            </a:r>
-            <a:endParaRPr lang="" altLang="en-US"/>
+              <a:rPr lang="en-US" altLang="en-US"/>
+              <a:t>Ray triangle intersection</a:t>
+            </a:r>
+            <a:endParaRPr lang="en-US" altLang="en-US"/>
           </a:p>
         </p:txBody>
       </p:sp>
@@ -14337,89 +14309,73 @@
         </p:nvSpPr>
         <p:spPr>
           <a:xfrm>
-            <a:off x="457200" y="2259330"/>
-            <a:ext cx="11119485" cy="4427855"/>
+            <a:off x="445135" y="2275205"/>
+            <a:ext cx="11225530" cy="4327525"/>
           </a:xfrm>
         </p:spPr>
         <p:txBody>
           <a:bodyPr/>
           <a:p>
             <a:r>
-              <a:rPr lang="" altLang="en-US"/>
-              <a:t>For each light source we illuminate the object using the illuminate funcrion from the light class. </a:t>
-            </a:r>
-            <a:endParaRPr lang="" altLang="en-US"/>
-          </a:p>
-          <a:p>
-            <a:r>
-              <a:rPr lang="" altLang="en-US"/>
-              <a:t>We recursivly call the trace function in order to determine shadows.</a:t>
-            </a:r>
-            <a:endParaRPr lang="" altLang="en-US"/>
+              <a:rPr lang="en-US" altLang="en-US"/>
+              <a:t>Ray triangle intersection is found using the Möller-Trumbore algorithm </a:t>
+            </a:r>
+            <a:endParaRPr lang="en-US" altLang="en-US"/>
+          </a:p>
+          <a:p>
+            <a:r>
+              <a:rPr lang="en-US" altLang="en-US"/>
+              <a:t>It utilized dot and cross products to evaluate the determinant of a system containing the </a:t>
+            </a:r>
+            <a:endParaRPr lang="en-US" altLang="en-US"/>
           </a:p>
           <a:p>
             <a:pPr lvl="1"/>
             <a:r>
-              <a:rPr lang="" altLang="en-US"/>
-              <a:t>If the trace function returns true the intersection point is in shadow</a:t>
-            </a:r>
-            <a:endParaRPr lang="" altLang="en-US"/>
+              <a:rPr lang="en-US" altLang="en-US" sz="1600"/>
+              <a:t>Ray origin </a:t>
+            </a:r>
+            <a:endParaRPr lang="en-US" altLang="en-US" sz="1600"/>
+          </a:p>
+          <a:p>
+            <a:pPr lvl="1"/>
+            <a:r>
+              <a:rPr lang="en-US" altLang="en-US"/>
+              <a:t>Ray direction</a:t>
+            </a:r>
+            <a:endParaRPr lang="en-US" altLang="en-US"/>
+          </a:p>
+          <a:p>
+            <a:pPr lvl="1"/>
+            <a:r>
+              <a:rPr lang="en-US" altLang="en-US"/>
+              <a:t>The triangle vertices</a:t>
+            </a:r>
+            <a:endParaRPr lang="en-US" altLang="en-US"/>
           </a:p>
           <a:p>
             <a:pPr lvl="0"/>
             <a:r>
-              <a:rPr lang="" altLang="en-US"/>
-              <a:t>Then we compute a simple pattern</a:t>
-            </a:r>
-            <a:endParaRPr lang="" altLang="en-US"/>
-          </a:p>
-          <a:p>
-            <a:pPr lvl="0"/>
-            <a:r>
-              <a:rPr lang="" altLang="en-US"/>
-              <a:t>At the end we compute the overal controbiutions of </a:t>
-            </a:r>
-            <a:endParaRPr lang="" altLang="en-US"/>
+              <a:rPr lang="en-US" altLang="en-US"/>
+              <a:t>and solves for </a:t>
+            </a:r>
+            <a:endParaRPr lang="en-US" altLang="en-US"/>
           </a:p>
           <a:p>
             <a:pPr lvl="1"/>
             <a:r>
-              <a:rPr lang="" altLang="en-US"/>
-              <a:t>potential shadow</a:t>
-            </a:r>
-            <a:endParaRPr lang="" altLang="en-US"/>
+              <a:rPr lang="en-US" altLang="en-US"/>
+              <a:t>The distance from the Ray origin</a:t>
+            </a:r>
+            <a:endParaRPr lang="en-US" altLang="en-US"/>
           </a:p>
           <a:p>
             <a:pPr lvl="1"/>
             <a:r>
-              <a:rPr lang="" altLang="en-US"/>
-              <a:t>pattern</a:t>
-            </a:r>
-            <a:endParaRPr lang="" altLang="en-US"/>
-          </a:p>
-          <a:p>
-            <a:pPr lvl="1"/>
-            <a:r>
-              <a:rPr lang="" altLang="en-US"/>
-              <a:t>light intensity </a:t>
-            </a:r>
-            <a:endParaRPr lang="" altLang="en-US"/>
-          </a:p>
-          <a:p>
-            <a:pPr lvl="1"/>
-            <a:r>
-              <a:rPr lang="" altLang="en-US"/>
-              <a:t>the objects normal</a:t>
-            </a:r>
-            <a:endParaRPr lang="" altLang="en-US"/>
-          </a:p>
-          <a:p>
-            <a:pPr lvl="2"/>
-            <a:r>
-              <a:rPr lang="" altLang="en-US"/>
-              <a:t>If we enabled shooth shading or not ( the default is on )</a:t>
-            </a:r>
-            <a:endParaRPr lang="" altLang="en-US"/>
+              <a:rPr lang="en-US" altLang="en-US"/>
+              <a:t>And the u,v coordinates of the intersection point</a:t>
+            </a:r>
+            <a:endParaRPr lang="en-US" altLang="en-US"/>
           </a:p>
         </p:txBody>
       </p:sp>
@@ -14456,10 +14412,10 @@
           <a:bodyPr/>
           <a:p>
             <a:r>
-              <a:rPr lang="" altLang="en-US"/>
-              <a:t>Illuminate</a:t>
-            </a:r>
-            <a:endParaRPr lang="" altLang="en-US"/>
+              <a:rPr lang="en-US" altLang="en-US"/>
+              <a:t>Shading - Diffuse</a:t>
+            </a:r>
+            <a:endParaRPr lang="en-US" altLang="en-US"/>
           </a:p>
         </p:txBody>
       </p:sp>
@@ -14475,104 +14431,89 @@
         </p:nvSpPr>
         <p:spPr>
           <a:xfrm>
-            <a:off x="474345" y="2312035"/>
-            <a:ext cx="11143615" cy="4208780"/>
+            <a:off x="457200" y="2259330"/>
+            <a:ext cx="11119485" cy="4427855"/>
           </a:xfrm>
         </p:spPr>
         <p:txBody>
-          <a:bodyPr>
-            <a:normAutofit lnSpcReduction="20000"/>
-          </a:bodyPr>
-          <a:p>
-            <a:r>
-              <a:rPr lang="" altLang="en-US"/>
-              <a:t>Depending on the type of light in the scene and its given </a:t>
-            </a:r>
-            <a:endParaRPr lang="" altLang="en-US"/>
+          <a:bodyPr/>
+          <a:p>
+            <a:r>
+              <a:rPr lang="en-US" altLang="en-US"/>
+              <a:t>For each light source we illuminate the object using the illuminate function from the light class. </a:t>
+            </a:r>
+            <a:endParaRPr lang="en-US" altLang="en-US"/>
+          </a:p>
+          <a:p>
+            <a:r>
+              <a:rPr lang="en-US" altLang="en-US"/>
+              <a:t>We recursively call the trace function in order to determine shadows.</a:t>
+            </a:r>
+            <a:endParaRPr lang="en-US" altLang="en-US"/>
           </a:p>
           <a:p>
             <a:pPr lvl="1"/>
             <a:r>
-              <a:rPr lang="" altLang="en-US"/>
-              <a:t>light to world matrix</a:t>
-            </a:r>
-            <a:endParaRPr lang="" altLang="en-US"/>
+              <a:rPr lang="en-US" altLang="en-US"/>
+              <a:t>If the trace function returns true the intersection point is in shadow</a:t>
+            </a:r>
+            <a:endParaRPr lang="en-US" altLang="en-US"/>
+          </a:p>
+          <a:p>
+            <a:pPr lvl="0"/>
+            <a:r>
+              <a:rPr lang="en-US" altLang="en-US"/>
+              <a:t>Then we compute a simple pattern</a:t>
+            </a:r>
+            <a:endParaRPr lang="en-US" altLang="en-US"/>
+          </a:p>
+          <a:p>
+            <a:pPr lvl="0"/>
+            <a:r>
+              <a:rPr lang="en-US" altLang="en-US"/>
+              <a:t>At the end we compute the overall contributions of </a:t>
+            </a:r>
+            <a:endParaRPr lang="en-US" altLang="en-US"/>
           </a:p>
           <a:p>
             <a:pPr lvl="1"/>
             <a:r>
-              <a:rPr lang="" altLang="en-US"/>
-              <a:t>colour </a:t>
-            </a:r>
-            <a:endParaRPr lang="" altLang="en-US"/>
+              <a:rPr lang="en-US" altLang="en-US"/>
+              <a:t>potential shadow</a:t>
+            </a:r>
+            <a:endParaRPr lang="en-US" altLang="en-US"/>
           </a:p>
           <a:p>
             <a:pPr lvl="1"/>
             <a:r>
-              <a:rPr lang="" altLang="en-US"/>
-              <a:t>intensity</a:t>
-            </a:r>
-            <a:endParaRPr lang="" altLang="en-US"/>
-          </a:p>
-          <a:p>
-            <a:pPr lvl="0"/>
-            <a:r>
-              <a:rPr lang="" altLang="en-US" sz="1800"/>
-              <a:t>We culculate its contribuituion and produse the hit point position, light direction, light intencity and distance to the intersected triangle </a:t>
-            </a:r>
-            <a:endParaRPr lang="" altLang="en-US"/>
-          </a:p>
-          <a:p>
-            <a:pPr lvl="0"/>
-            <a:r>
-              <a:rPr lang="" altLang="en-US" sz="1800"/>
-              <a:t>If the light is a point light </a:t>
-            </a:r>
-            <a:endParaRPr lang="" altLang="en-US" sz="1800"/>
+              <a:rPr lang="en-US" altLang="en-US"/>
+              <a:t>pattern</a:t>
+            </a:r>
+            <a:endParaRPr lang="en-US" altLang="en-US"/>
           </a:p>
           <a:p>
             <a:pPr lvl="1"/>
             <a:r>
-              <a:rPr lang="" altLang="en-US" sz="1600"/>
-              <a:t>We use the inverse square law to attenuate the light intensity ( by using the square of this vector length )</a:t>
-            </a:r>
-            <a:endParaRPr lang="" altLang="en-US" sz="1420"/>
-          </a:p>
-          <a:p>
-            <a:pPr lvl="0"/>
-            <a:r>
-              <a:rPr lang="" altLang="en-US" sz="1800"/>
-              <a:t>If the light is a distand light </a:t>
-            </a:r>
-            <a:r>
-              <a:rPr lang="" altLang="en-US"/>
-              <a:t> </a:t>
-            </a:r>
-            <a:endParaRPr lang="" altLang="en-US"/>
+              <a:rPr lang="en-US" altLang="en-US"/>
+              <a:t>light intensity </a:t>
+            </a:r>
+            <a:endParaRPr lang="en-US" altLang="en-US"/>
           </a:p>
           <a:p>
             <a:pPr lvl="1"/>
             <a:r>
-              <a:rPr lang="" altLang="en-US"/>
-              <a:t>We acount for the colour and the inensity</a:t>
-            </a:r>
-            <a:endParaRPr lang="" altLang="en-US"/>
-          </a:p>
-          <a:p>
-            <a:pPr lvl="1"/>
-            <a:r>
-              <a:rPr lang="" altLang="en-US"/>
-              <a:t>The direction remains the default </a:t>
-            </a:r>
-            <a:endParaRPr lang="" altLang="en-US"/>
-          </a:p>
-          <a:p>
-            <a:pPr lvl="1"/>
-            <a:r>
-              <a:rPr lang="" altLang="en-US"/>
-              <a:t>The distance is set as the max distance</a:t>
-            </a:r>
-            <a:endParaRPr lang="" altLang="en-US"/>
+              <a:rPr lang="en-US" altLang="en-US"/>
+              <a:t>the objects normal</a:t>
+            </a:r>
+            <a:endParaRPr lang="en-US" altLang="en-US"/>
+          </a:p>
+          <a:p>
+            <a:pPr lvl="2"/>
+            <a:r>
+              <a:rPr lang="en-US" altLang="en-US"/>
+              <a:t>If we enabled smooth shading or not ( the default is on )</a:t>
+            </a:r>
+            <a:endParaRPr lang="en-US" altLang="en-US"/>
           </a:p>
         </p:txBody>
       </p:sp>
@@ -14609,10 +14550,10 @@
           <a:bodyPr/>
           <a:p>
             <a:r>
-              <a:rPr lang="" altLang="en-US"/>
-              <a:t>Shading - Reflect</a:t>
-            </a:r>
-            <a:endParaRPr lang="" altLang="en-US"/>
+              <a:rPr lang="en-US" altLang="en-US"/>
+              <a:t>Illuminate</a:t>
+            </a:r>
+            <a:endParaRPr lang="en-US" altLang="en-US"/>
           </a:p>
         </p:txBody>
       </p:sp>
@@ -14628,37 +14569,104 @@
         </p:nvSpPr>
         <p:spPr>
           <a:xfrm>
-            <a:off x="384175" y="2275205"/>
-            <a:ext cx="11264265" cy="4364990"/>
+            <a:off x="474345" y="2312035"/>
+            <a:ext cx="11143615" cy="4208780"/>
           </a:xfrm>
         </p:spPr>
         <p:txBody>
-          <a:bodyPr/>
-          <a:p>
-            <a:r>
-              <a:rPr lang="" altLang="en-US"/>
-              <a:t>If the object is a mirror like surface we </a:t>
-            </a:r>
-            <a:r>
-              <a:rPr lang="en-US"/>
-              <a:t>compute the reflection direction using the incident view direction (the primary ray direction) and the normal of the surface at the intersection point.</a:t>
-            </a:r>
-            <a:r>
-              <a:rPr lang="" altLang="en-US"/>
+          <a:bodyPr>
+            <a:normAutofit lnSpcReduction="20000"/>
+          </a:bodyPr>
+          <a:p>
+            <a:r>
+              <a:rPr lang="en-US" altLang="en-US"/>
+              <a:t>Depending on the type of light in the scene and its given </a:t>
+            </a:r>
+            <a:endParaRPr lang="en-US" altLang="en-US"/>
+          </a:p>
+          <a:p>
+            <a:pPr lvl="1"/>
+            <a:r>
+              <a:rPr lang="en-US" altLang="en-US"/>
+              <a:t>light to world matrix</a:t>
+            </a:r>
+            <a:endParaRPr lang="en-US" altLang="en-US"/>
+          </a:p>
+          <a:p>
+            <a:pPr lvl="1"/>
+            <a:r>
+              <a:rPr lang="en-US" altLang="en-US"/>
+              <a:t>colour </a:t>
+            </a:r>
+            <a:endParaRPr lang="en-US" altLang="en-US"/>
+          </a:p>
+          <a:p>
+            <a:pPr lvl="1"/>
+            <a:r>
+              <a:rPr lang="en-US" altLang="en-US"/>
+              <a:t>intensity</a:t>
+            </a:r>
+            <a:endParaRPr lang="en-US" altLang="en-US"/>
+          </a:p>
+          <a:p>
+            <a:pPr lvl="0"/>
+            <a:r>
+              <a:rPr lang="en-US" altLang="en-US" sz="1800"/>
+              <a:t>We calculate its contribution and produce the hit point position, light direction, light intensity and distance to the intersected triangle </a:t>
+            </a:r>
+            <a:endParaRPr lang="en-US" altLang="en-US"/>
+          </a:p>
+          <a:p>
+            <a:pPr lvl="0"/>
+            <a:r>
+              <a:rPr lang="en-US" altLang="en-US" sz="1800"/>
+              <a:t>If the light is a point light </a:t>
+            </a:r>
+            <a:endParaRPr lang="en-US" altLang="en-US" sz="1800"/>
+          </a:p>
+          <a:p>
+            <a:pPr lvl="1"/>
+            <a:r>
+              <a:rPr lang="en-US" altLang="en-US" sz="1600"/>
+              <a:t>We use the inverse square law to attenuate the light intensity ( by using the square of this vector length )</a:t>
+            </a:r>
+            <a:endParaRPr lang="en-US" altLang="en-US" sz="1420"/>
+          </a:p>
+          <a:p>
+            <a:pPr lvl="0"/>
+            <a:r>
+              <a:rPr lang="en-US" altLang="en-US" sz="1800"/>
+              <a:t>If the light is a distant light </a:t>
+            </a:r>
+            <a:r>
+              <a:rPr lang="en-US" altLang="en-US"/>
               <a:t> </a:t>
             </a:r>
-            <a:r>
-              <a:rPr lang="en-US"/>
-              <a:t>R = I−2(N⋅I)N</a:t>
-            </a:r>
-            <a:endParaRPr lang="en-US"/>
-          </a:p>
-          <a:p>
-            <a:r>
-              <a:rPr lang="en-US"/>
-              <a:t>Use the ray direction to find the hit normal</a:t>
-            </a:r>
-            <a:endParaRPr lang="en-US"/>
+            <a:endParaRPr lang="en-US" altLang="en-US"/>
+          </a:p>
+          <a:p>
+            <a:pPr lvl="1"/>
+            <a:r>
+              <a:rPr lang="en-US" altLang="en-US"/>
+              <a:t>We account for the colour and the intensity</a:t>
+            </a:r>
+            <a:endParaRPr lang="en-US" altLang="en-US"/>
+          </a:p>
+          <a:p>
+            <a:pPr lvl="1"/>
+            <a:r>
+              <a:rPr lang="en-US" altLang="en-US"/>
+              <a:t>The direction remains the default </a:t>
+            </a:r>
+            <a:endParaRPr lang="en-US" altLang="en-US"/>
+          </a:p>
+          <a:p>
+            <a:pPr lvl="1"/>
+            <a:r>
+              <a:rPr lang="en-US" altLang="en-US"/>
+              <a:t>The distance is set as the max distance</a:t>
+            </a:r>
+            <a:endParaRPr lang="en-US" altLang="en-US"/>
           </a:p>
         </p:txBody>
       </p:sp>
@@ -14698,11 +14706,7 @@
               <a:rPr lang="en-US" altLang="en-US"/>
               <a:t>Shading - Reflect</a:t>
             </a:r>
-            <a:r>
-              <a:rPr lang="" altLang="en-US"/>
-              <a:t> and Refract</a:t>
-            </a:r>
-            <a:endParaRPr lang="" altLang="en-US"/>
+            <a:endParaRPr lang="en-US" altLang="en-US"/>
           </a:p>
         </p:txBody>
       </p:sp>
@@ -14726,37 +14730,29 @@
           <a:bodyPr/>
           <a:p>
             <a:r>
-              <a:rPr lang="" altLang="en-US"/>
-              <a:t>What we need to find is the refraction and reflection colour and mix them with a weight</a:t>
-            </a:r>
-            <a:endParaRPr lang="" altLang="en-US"/>
-          </a:p>
-          <a:p>
-            <a:r>
-              <a:rPr lang="" altLang="en-US"/>
-              <a:t>At first we compute fresnel equation (relation of reflected light for a given incident direction and surface normal) based on Ray direction, hit normal, index of refraction and that gives us the kr factor.</a:t>
-            </a:r>
-            <a:endParaRPr lang="" altLang="en-US"/>
-          </a:p>
-          <a:p>
-            <a:r>
-              <a:rPr lang="" altLang="en-US"/>
-              <a:t>This factor then is used to determine if this is not a case of total internal reflextion to compute the refraction</a:t>
-            </a:r>
-            <a:endParaRPr lang="" altLang="en-US"/>
-          </a:p>
-          <a:p>
-            <a:r>
-              <a:rPr lang="" altLang="en-US"/>
-              <a:t>After that the castRay function is recursivly called to culculate the next ray from that point with a plus 1 to the depth in order to stop at the selected </a:t>
-            </a:r>
-            <a:endParaRPr lang="" altLang="en-US"/>
-          </a:p>
-          <a:p>
-            <a:endParaRPr lang="" altLang="en-US"/>
-          </a:p>
-          <a:p>
-            <a:endParaRPr lang="" altLang="en-US"/>
+              <a:rPr lang="en-US" altLang="en-US"/>
+              <a:t>If the object is a mirror like surface we </a:t>
+            </a:r>
+            <a:r>
+              <a:rPr lang="en-US"/>
+              <a:t>compute the reflection direction using the incident view direction (the primary ray direction) and the normal of the surface at the intersection point.</a:t>
+            </a:r>
+            <a:r>
+              <a:rPr lang="en-US" altLang="en-US"/>
+              <a:t> </a:t>
+            </a:r>
+            <a:r>
+              <a:rPr lang="en-US"/>
+              <a:t>R = I−2(N⋅I)N</a:t>
+            </a:r>
+            <a:endParaRPr lang="en-US"/>
+          </a:p>
+          <a:p>
+            <a:r>
+              <a:rPr lang="en-US"/>
+              <a:t>Use the ray direction to find the hit normal</a:t>
+            </a:r>
+            <a:endParaRPr lang="en-US"/>
           </a:p>
         </p:txBody>
       </p:sp>
@@ -14794,13 +14790,9 @@
           <a:p>
             <a:r>
               <a:rPr lang="en-US" altLang="en-US"/>
-              <a:t>Shading - </a:t>
-            </a:r>
-            <a:r>
-              <a:rPr lang="" altLang="en-US"/>
-              <a:t>Phong</a:t>
-            </a:r>
-            <a:endParaRPr lang="" altLang="en-US"/>
+              <a:t>Shading - Reflect and Refract</a:t>
+            </a:r>
+            <a:endParaRPr lang="en-US" altLang="en-US"/>
           </a:p>
         </p:txBody>
       </p:sp>
@@ -14824,17 +14816,111 @@
           <a:bodyPr/>
           <a:p>
             <a:r>
-              <a:rPr lang="" altLang="en-US"/>
-              <a:t>Like the diffuse material type Phong is a kinda more advanst diffuse effect incorporating specular light reflection.</a:t>
-            </a:r>
-            <a:endParaRPr lang="" altLang="en-US"/>
+              <a:rPr lang="en-US" altLang="en-US"/>
+              <a:t>What we need to find is the refraction and reflection colour and mix them with a weight</a:t>
+            </a:r>
+            <a:endParaRPr lang="en-US" altLang="en-US"/>
+          </a:p>
+          <a:p>
+            <a:r>
+              <a:rPr lang="en-US" altLang="en-US"/>
+              <a:t>At first we compute Fresnel equation (relation of reflected light for a given incident direction and surface normal) based on Ray direction, hit normal, index of refraction and that gives us the kr factor.</a:t>
+            </a:r>
+            <a:endParaRPr lang="en-US" altLang="en-US"/>
+          </a:p>
+          <a:p>
+            <a:r>
+              <a:rPr lang="en-US" altLang="en-US"/>
+              <a:t>This factor then is used to determine if this is not a case of total internal reflection to compute the refraction</a:t>
+            </a:r>
+            <a:endParaRPr lang="en-US" altLang="en-US"/>
+          </a:p>
+          <a:p>
+            <a:r>
+              <a:rPr lang="en-US" altLang="en-US"/>
+              <a:t>After that the castRay function is recursively called to calculate the next ray from that point with a plus 1 to the depth in order to stop at the selected </a:t>
+            </a:r>
+            <a:endParaRPr lang="en-US" altLang="en-US"/>
+          </a:p>
+          <a:p>
+            <a:endParaRPr lang="en-US" altLang="en-US"/>
+          </a:p>
+          <a:p>
+            <a:endParaRPr lang="en-US" altLang="en-US"/>
+          </a:p>
+        </p:txBody>
+      </p:sp>
+    </p:spTree>
+  </p:cSld>
+  <p:clrMapOvr>
+    <a:masterClrMapping/>
+  </p:clrMapOvr>
+</p:sld>
+</file>
+
+<file path=ppt/slides/slide18.xml><?xml version="1.0" encoding="utf-8"?>
+<p:sld xmlns:a="http://schemas.openxmlformats.org/drawingml/2006/main" xmlns:r="http://schemas.openxmlformats.org/officeDocument/2006/relationships" xmlns:p="http://schemas.openxmlformats.org/presentationml/2006/main">
+  <p:cSld>
+    <p:spTree>
+      <p:nvGrpSpPr>
+        <p:cNvPr id="1" name=""/>
+        <p:cNvGrpSpPr/>
+        <p:nvPr/>
+      </p:nvGrpSpPr>
+      <p:grpSpPr/>
+      <p:sp>
+        <p:nvSpPr>
+          <p:cNvPr id="2" name="Title 1"/>
+          <p:cNvSpPr>
+            <a:spLocks noGrp="true"/>
+          </p:cNvSpPr>
+          <p:nvPr>
+            <p:ph type="title"/>
+          </p:nvPr>
+        </p:nvSpPr>
+        <p:spPr/>
+        <p:txBody>
+          <a:bodyPr/>
+          <a:p>
+            <a:r>
+              <a:rPr lang="en-US" altLang="en-US"/>
+              <a:t>Shading - Phong</a:t>
+            </a:r>
+            <a:endParaRPr lang="en-US" altLang="en-US"/>
+          </a:p>
+        </p:txBody>
+      </p:sp>
+      <p:sp>
+        <p:nvSpPr>
+          <p:cNvPr id="3" name="Content Placeholder 2"/>
+          <p:cNvSpPr>
+            <a:spLocks noGrp="true"/>
+          </p:cNvSpPr>
+          <p:nvPr>
+            <p:ph idx="1"/>
+          </p:nvPr>
+        </p:nvSpPr>
+        <p:spPr>
+          <a:xfrm>
+            <a:off x="384175" y="2275205"/>
+            <a:ext cx="11264265" cy="4364990"/>
+          </a:xfrm>
+        </p:spPr>
+        <p:txBody>
+          <a:bodyPr/>
+          <a:p>
+            <a:r>
+              <a:rPr lang="en-US" altLang="en-US"/>
+              <a:t>Like the diffuse material type Phong is a kinda more advanced diffuse effect incorporating specular light reflection.</a:t>
+            </a:r>
+            <a:endParaRPr lang="en-US" altLang="en-US"/>
           </a:p>
           <a:p>
             <a:r>
               <a:rPr lang="en-US" altLang="en-US">
                 <a:sym typeface="+mn-ea"/>
               </a:rPr>
-              <a:t>For each light source we illuminate the object using the illuminate funcrion from the light class. </a:t>
+              <a:t>For each light source we illuminate the object using the illuminate function from the light class. </a:t>
             </a:r>
             <a:endParaRPr lang="en-US" altLang="en-US">
               <a:sym typeface="+mn-ea"/>
@@ -14845,7 +14931,7 @@
               <a:rPr lang="en-US" altLang="en-US" sz="1800">
                 <a:sym typeface="+mn-ea"/>
               </a:rPr>
-              <a:t>We recursivly call the trace function in order to determine shadows.</a:t>
+              <a:t>We recursively call the trace function in order to determine shadows.</a:t>
             </a:r>
             <a:endParaRPr lang="en-US" altLang="en-US" sz="1800"/>
           </a:p>
@@ -14864,37 +14950,37 @@
           <a:p>
             <a:pPr lvl="0"/>
             <a:r>
-              <a:rPr lang="" altLang="en-US" sz="2025"/>
+              <a:rPr lang="en-US" altLang="en-US" sz="2025"/>
               <a:t>And now the differences starts we compute </a:t>
             </a:r>
-            <a:endParaRPr lang="" altLang="en-US" sz="2025"/>
+            <a:endParaRPr lang="en-US" altLang="en-US" sz="2025"/>
           </a:p>
           <a:p>
             <a:pPr lvl="1"/>
             <a:r>
-              <a:rPr lang="" altLang="en-US" sz="1800"/>
+              <a:rPr lang="en-US" altLang="en-US" sz="1800"/>
               <a:t>the diffuse component based on the albedo if the object settings (ratio of reflected light over the amount of incident light) value that reflects a bit of he light falling on an object </a:t>
             </a:r>
-            <a:endParaRPr lang="" altLang="en-US" sz="1800"/>
+            <a:endParaRPr lang="en-US" altLang="en-US" sz="1800"/>
           </a:p>
           <a:p>
             <a:pPr lvl="1"/>
             <a:r>
-              <a:rPr lang="" altLang="en-US" sz="1800"/>
+              <a:rPr lang="en-US" altLang="en-US" sz="1800"/>
               <a:t>the specular component is based on the n factor of the objects settings</a:t>
             </a:r>
-            <a:endParaRPr lang="" altLang="en-US" sz="1800"/>
+            <a:endParaRPr lang="en-US" altLang="en-US" sz="1800"/>
           </a:p>
           <a:p>
             <a:pPr lvl="0"/>
             <a:r>
-              <a:rPr lang="" altLang="en-US" sz="2025"/>
+              <a:rPr lang="en-US" altLang="en-US" sz="2025"/>
               <a:t>At the end the two are mixed  </a:t>
             </a:r>
             <a:endParaRPr lang="en-US" altLang="en-US" sz="1800"/>
           </a:p>
           <a:p>
-            <a:endParaRPr lang="" altLang="en-US"/>
+            <a:endParaRPr lang="en-US" altLang="en-US"/>
           </a:p>
         </p:txBody>
       </p:sp>
@@ -15016,7 +15102,7 @@
             <a:pPr lvl="1"/>
             <a:r>
               <a:rPr lang="en-US" altLang="en-GB"/>
-              <a:t>Scene data file .sod - it specifices things such as resoluion, lighting in the scene etc.</a:t>
+              <a:t>Scene data file .sod - it specifies things such as resolution, lighting in the scene etc.</a:t>
             </a:r>
             <a:endParaRPr lang="en-US" altLang="en-GB"/>
           </a:p>
@@ -15024,7 +15110,7 @@
             <a:pPr lvl="1"/>
             <a:r>
               <a:rPr lang="en-US" altLang="en-GB"/>
-              <a:t>How many objects are in the scne</a:t>
+              <a:t>How many objects are in the scene</a:t>
             </a:r>
             <a:endParaRPr lang="en-US" altLang="en-GB"/>
           </a:p>
@@ -15032,7 +15118,7 @@
             <a:pPr lvl="1"/>
             <a:r>
               <a:rPr lang="en-US" altLang="en-GB"/>
-              <a:t>Geometry descreption file .geo - contains vertex, texture and other data</a:t>
+              <a:t>Geometry description file .geo - contains vertex, texture and other data</a:t>
             </a:r>
             <a:endParaRPr lang="en-US" altLang="en-GB"/>
           </a:p>
@@ -15131,7 +15217,7 @@
           <a:p>
             <a:r>
               <a:rPr lang="en-US"/>
-              <a:t>options-&gt;fov: Feild of view changes how much of the scene is visible </a:t>
+              <a:t>options-&gt;fov: Field of view changes how much of the scene is visible </a:t>
             </a:r>
             <a:endParaRPr lang="en-US"/>
           </a:p>
@@ -15214,7 +15300,7 @@
           <a:p>
             <a:r>
               <a:rPr lang="en-US"/>
-              <a:t>Light 2 world no default	// lightdata_struct-&gt;light2world Light to world coordinat</a:t>
+              <a:t>Light 2 world no default	// lightdata_struct-&gt;light2world Light to world coordinates</a:t>
             </a:r>
             <a:endParaRPr lang="en-US"/>
           </a:p>
@@ -15531,7 +15617,7 @@
           <a:p>
             <a:r>
               <a:rPr lang="en-US" altLang="en-US"/>
-              <a:t>The framebuffer is modeled after a plane block ram as a chunck of memory </a:t>
+              <a:t>The frame-buffer is modelled after a plane block ram as a chunk of memory </a:t>
             </a:r>
             <a:endParaRPr lang="en-US" altLang="en-US"/>
           </a:p>
@@ -15600,7 +15686,7 @@
           <a:p>
             <a:r>
               <a:rPr lang="en-US" altLang="en-US"/>
-              <a:t>Rendering the scene is taken care of a double loop that itterates each pixel ( render )</a:t>
+              <a:t>Rendering the scene is taken care of a double loop that iterates each pixel ( render )</a:t>
             </a:r>
             <a:endParaRPr lang="en-US" altLang="en-US"/>
           </a:p>
@@ -15631,7 +15717,7 @@
             <a:pPr lvl="0"/>
             <a:r>
               <a:rPr lang="en-US" altLang="en-US"/>
-              <a:t>Trace the Ray by itterating through the list of objects ( trace )</a:t>
+              <a:t>Trace the Ray by iterating through the list of objects ( trace )</a:t>
             </a:r>
             <a:endParaRPr lang="en-US" altLang="en-US"/>
           </a:p>
@@ -15639,7 +15725,7 @@
             <a:pPr lvl="1"/>
             <a:r>
               <a:rPr lang="en-US" altLang="en-US" sz="1600"/>
-              <a:t>If the Ray intersects, is nearer, the Ray type is not shodow and the object is not reflecting and refracting then we record its</a:t>
+              <a:t>If the Ray intersects, is nearer, the Ray type is not shadow and the object is not reflecting and refracting then we record its</a:t>
             </a:r>
             <a:endParaRPr lang="en-US" altLang="en-US" sz="1600"/>
           </a:p>
@@ -15737,10 +15823,10 @@
           <a:bodyPr/>
           <a:p>
             <a:r>
-              <a:rPr lang="en-US" altLang="en-US"/>
-              <a:t>Render</a:t>
-            </a:r>
-            <a:endParaRPr lang="en-US" altLang="en-US"/>
+              <a:rPr lang="" altLang="en-US"/>
+              <a:t>The Performance</a:t>
+            </a:r>
+            <a:endParaRPr lang="" altLang="en-US"/>
           </a:p>
         </p:txBody>
       </p:sp>
@@ -15756,48 +15842,58 @@
         </p:nvSpPr>
         <p:spPr>
           <a:xfrm>
-            <a:off x="472440" y="2251075"/>
-            <a:ext cx="11119485" cy="4427855"/>
+            <a:off x="541655" y="2289175"/>
+            <a:ext cx="5113020" cy="4367530"/>
           </a:xfrm>
         </p:spPr>
         <p:txBody>
           <a:bodyPr/>
           <a:p>
             <a:r>
-              <a:rPr lang="en-US" altLang="en-US"/>
-              <a:t>This is the base render function, it serves the perpose of culculating the coodinates of the pixels in order for the ray to pass buy the center of the pixel </a:t>
-            </a:r>
-            <a:endParaRPr lang="en-US" altLang="en-US"/>
-          </a:p>
-          <a:p>
-            <a:r>
-              <a:rPr lang="en-US" altLang="en-US"/>
-              <a:t>Multiply the pixel coordinates with the camera to world matrix to generate the rays from the desired point in space</a:t>
-            </a:r>
-            <a:endParaRPr lang="en-US" altLang="en-US"/>
-          </a:p>
-          <a:p>
-            <a:r>
               <a:rPr lang="" altLang="en-US"/>
-              <a:t>For each pixel we culculate a direction nad sent it to be cast as a Ray</a:t>
+              <a:t>The performance varies with the scene, it ranges from 0.18 to 2800 seconds </a:t>
             </a:r>
             <a:endParaRPr lang="" altLang="en-US"/>
           </a:p>
           <a:p>
             <a:r>
               <a:rPr lang="" altLang="en-US"/>
-              <a:t>At the end of this proccess we build the final image </a:t>
-            </a:r>
-            <a:endParaRPr lang="" altLang="en-US"/>
-          </a:p>
-          <a:p>
-            <a:pPr marL="0" indent="0">
-              <a:buNone/>
-            </a:pPr>
-            <a:endParaRPr lang="" altLang="en-US"/>
+              <a:t>The culprit is </a:t>
+            </a:r>
+            <a:r>
+              <a:rPr lang="en-US" altLang="en-US">
+                <a:sym typeface="+mn-ea"/>
+              </a:rPr>
+              <a:t>ray Triangle Intersect</a:t>
+            </a:r>
+            <a:r>
+              <a:rPr lang="" altLang="en-US">
+                <a:sym typeface="+mn-ea"/>
+              </a:rPr>
+              <a:t> function and it’s accompanying operations taking the majority of CPU time</a:t>
+            </a:r>
+            <a:endParaRPr lang="" altLang="en-US">
+              <a:sym typeface="+mn-ea"/>
+            </a:endParaRPr>
           </a:p>
         </p:txBody>
       </p:sp>
+      <p:graphicFrame>
+        <p:nvGraphicFramePr>
+          <p:cNvPr id="5" name="Chart 4"/>
+          <p:cNvGraphicFramePr/>
+          <p:nvPr/>
+        </p:nvGraphicFramePr>
+        <p:xfrm>
+          <a:off x="5654675" y="2288858"/>
+          <a:ext cx="6159500" cy="4346575"/>
+        </p:xfrm>
+        <a:graphic>
+          <a:graphicData uri="http://schemas.openxmlformats.org/drawingml/2006/chart">
+            <c:chart xmlns:c="http://schemas.openxmlformats.org/drawingml/2006/chart" xmlns:r="http://schemas.openxmlformats.org/officeDocument/2006/relationships" r:id="rId1"/>
+          </a:graphicData>
+        </a:graphic>
+      </p:graphicFrame>
     </p:spTree>
   </p:cSld>
   <p:clrMapOvr>
@@ -15832,7 +15928,7 @@
           <a:p>
             <a:r>
               <a:rPr lang="en-US" altLang="en-US"/>
-              <a:t>Cast the ray</a:t>
+              <a:t>Render</a:t>
             </a:r>
             <a:endParaRPr lang="en-US" altLang="en-US"/>
           </a:p>
@@ -15850,8 +15946,8 @@
         </p:nvSpPr>
         <p:spPr>
           <a:xfrm>
-            <a:off x="472440" y="2273935"/>
-            <a:ext cx="11180445" cy="4198620"/>
+            <a:off x="472440" y="2251075"/>
+            <a:ext cx="11119485" cy="4427855"/>
           </a:xfrm>
         </p:spPr>
         <p:txBody>
@@ -15859,58 +15955,35 @@
           <a:p>
             <a:r>
               <a:rPr lang="en-US" altLang="en-US"/>
-              <a:t>This is where if there is an intersection point it gets coloured based on its type</a:t>
-            </a:r>
-            <a:r>
-              <a:rPr lang="" altLang="en-US"/>
-              <a:t> whitch we will discus afterwords</a:t>
-            </a:r>
+              <a:t>This is the base render function, it serves the purpose of calculating the coordinates of the pixels in order for the ray to pass buy the centre of the pixel </a:t>
+            </a:r>
+            <a:endParaRPr lang="en-US" altLang="en-US"/>
+          </a:p>
+          <a:p>
             <a:r>
               <a:rPr lang="en-US" altLang="en-US"/>
-              <a:t> </a:t>
+              <a:t>Multiply the pixel coordinates with the camera to world matrix to generate the rays from the desired point in space</a:t>
             </a:r>
             <a:endParaRPr lang="en-US" altLang="en-US"/>
           </a:p>
           <a:p>
-            <a:pPr lvl="1"/>
             <a:r>
               <a:rPr lang="en-US" altLang="en-US"/>
-              <a:t>Diffuse </a:t>
+              <a:t>For each pixel we calculate a direction and sent it to be cast as a Ray</a:t>
             </a:r>
             <a:endParaRPr lang="en-US" altLang="en-US"/>
           </a:p>
           <a:p>
-            <a:pPr lvl="1"/>
             <a:r>
               <a:rPr lang="en-US" altLang="en-US"/>
-              <a:t>Reflect</a:t>
+              <a:t>At the end of this process we build the final image </a:t>
             </a:r>
             <a:endParaRPr lang="en-US" altLang="en-US"/>
           </a:p>
           <a:p>
-            <a:pPr lvl="1"/>
-            <a:r>
-              <a:rPr lang="en-US" altLang="en-GB">
-                <a:sym typeface="+mn-ea"/>
-              </a:rPr>
-              <a:t>Reflect and refract </a:t>
-            </a:r>
-            <a:endParaRPr lang="en-US" altLang="en-GB"/>
-          </a:p>
-          <a:p>
-            <a:pPr lvl="1"/>
-            <a:r>
-              <a:rPr lang="en-US" altLang="en-US"/>
-              <a:t>Phong </a:t>
-            </a:r>
-            <a:endParaRPr lang="en-US" altLang="en-US"/>
-          </a:p>
-          <a:p>
-            <a:pPr lvl="0"/>
-            <a:endParaRPr lang="en-US" altLang="en-US"/>
-          </a:p>
-          <a:p>
-            <a:pPr lvl="0"/>
+            <a:pPr marL="0" indent="0">
+              <a:buNone/>
+            </a:pPr>
             <a:endParaRPr lang="en-US" altLang="en-US"/>
           </a:p>
         </p:txBody>

</xml_diff>